<commit_message>
addition of notes to jupyter notebooks
</commit_message>
<xml_diff>
--- a/workshop_documents/Introduction_workshop_slides.pptx
+++ b/workshop_documents/Introduction_workshop_slides.pptx
@@ -263,8 +263,11 @@
     </a:lvl9pPr>
   </p:defaultTextStyle>
   <p:extLst>
+    <p:ext uri="{EFAFB233-063F-42B5-8137-9DF3F51BA10A}">
+      <p15:sldGuideLst xmlns:p15="http://schemas.microsoft.com/office/powerpoint/2012/main"/>
+    </p:ext>
     <p:ext uri="http://customooxmlschemas.google.com/">
-      <go:slidesCustomData xmlns:go="http://customooxmlschemas.google.com/" xmlns:ahyp="http://schemas.microsoft.com/office/drawing/2018/hyperlinkcolor" xmlns:p15="http://schemas.microsoft.com/office/powerpoint/2012/main" xmlns:p14="http://schemas.microsoft.com/office/powerpoint/2010/main" xmlns:com="http://schemas.openxmlformats.org/drawingml/2006/compatibility" xmlns:pvml="urn:schemas-microsoft-com:office:powerpoint" xmlns:v="urn:schemas-microsoft-com:vml" xmlns:o="urn:schemas-microsoft-com:office:office" xmlns:dgm="http://schemas.openxmlformats.org/drawingml/2006/diagram" xmlns:c="http://schemas.openxmlformats.org/drawingml/2006/chart" xmlns:mv="urn:schemas-microsoft-com:mac:vml" xmlns:mc="http://schemas.openxmlformats.org/markup-compatibility/2006" xmlns="" r:id="rId27" roundtripDataSignature="AMtx7miwK0YCmhOXLv/tKLFCIIcQ0wGSYA=="/>
+      <go:slidesCustomData xmlns="" xmlns:mc="http://schemas.openxmlformats.org/markup-compatibility/2006" xmlns:mv="urn:schemas-microsoft-com:mac:vml" xmlns:c="http://schemas.openxmlformats.org/drawingml/2006/chart" xmlns:dgm="http://schemas.openxmlformats.org/drawingml/2006/diagram" xmlns:o="urn:schemas-microsoft-com:office:office" xmlns:v="urn:schemas-microsoft-com:vml" xmlns:pvml="urn:schemas-microsoft-com:office:powerpoint" xmlns:com="http://schemas.openxmlformats.org/drawingml/2006/compatibility" xmlns:p14="http://schemas.microsoft.com/office/powerpoint/2010/main" xmlns:p15="http://schemas.microsoft.com/office/powerpoint/2012/main" xmlns:ahyp="http://schemas.microsoft.com/office/drawing/2018/hyperlinkcolor" xmlns:go="http://customooxmlschemas.google.com/" r:id="rId27" roundtripDataSignature="AMtx7miwK0YCmhOXLv/tKLFCIIcQ0wGSYA=="/>
     </p:ext>
   </p:extLst>
 </p:presentation>
@@ -1577,6 +1580,174 @@
   <p:cSld>
     <p:spTree>
       <p:nvGrpSpPr>
+        <p:cNvPr id="1" name="Shape 144"/>
+        <p:cNvGrpSpPr/>
+        <p:nvPr/>
+      </p:nvGrpSpPr>
+      <p:grpSpPr>
+        <a:xfrm>
+          <a:off x="0" y="0"/>
+          <a:ext cx="0" cy="0"/>
+          <a:chOff x="0" y="0"/>
+          <a:chExt cx="0" cy="0"/>
+        </a:xfrm>
+      </p:grpSpPr>
+      <p:sp>
+        <p:nvSpPr>
+          <p:cNvPr id="145" name="Google Shape;145;p8:notes"/>
+          <p:cNvSpPr>
+            <a:spLocks noGrp="1" noRot="1" noChangeAspect="1"/>
+          </p:cNvSpPr>
+          <p:nvPr>
+            <p:ph type="sldImg" idx="2"/>
+          </p:nvPr>
+        </p:nvSpPr>
+        <p:spPr>
+          <a:xfrm>
+            <a:off x="685800" y="1143000"/>
+            <a:ext cx="5486400" cy="3086100"/>
+          </a:xfrm>
+          <a:custGeom>
+            <a:avLst/>
+            <a:gdLst/>
+            <a:ahLst/>
+            <a:cxnLst/>
+            <a:rect l="l" t="t" r="r" b="b"/>
+            <a:pathLst>
+              <a:path w="120000" h="120000" extrusionOk="0">
+                <a:moveTo>
+                  <a:pt x="0" y="0"/>
+                </a:moveTo>
+                <a:lnTo>
+                  <a:pt x="120000" y="0"/>
+                </a:lnTo>
+                <a:lnTo>
+                  <a:pt x="120000" y="120000"/>
+                </a:lnTo>
+                <a:lnTo>
+                  <a:pt x="0" y="120000"/>
+                </a:lnTo>
+                <a:close/>
+              </a:path>
+            </a:pathLst>
+          </a:custGeom>
+          <a:noFill/>
+          <a:ln w="12700" cap="flat" cmpd="sng">
+            <a:solidFill>
+              <a:srgbClr val="000000"/>
+            </a:solidFill>
+            <a:prstDash val="solid"/>
+            <a:round/>
+            <a:headEnd type="none" w="sm" len="sm"/>
+            <a:tailEnd type="none" w="sm" len="sm"/>
+          </a:ln>
+        </p:spPr>
+      </p:sp>
+      <p:sp>
+        <p:nvSpPr>
+          <p:cNvPr id="146" name="Google Shape;146;p8:notes"/>
+          <p:cNvSpPr txBox="1">
+            <a:spLocks noGrp="1"/>
+          </p:cNvSpPr>
+          <p:nvPr>
+            <p:ph type="body" idx="1"/>
+          </p:nvPr>
+        </p:nvSpPr>
+        <p:spPr>
+          <a:xfrm>
+            <a:off x="685800" y="4400550"/>
+            <a:ext cx="5486400" cy="3600450"/>
+          </a:xfrm>
+          <a:prstGeom prst="rect">
+            <a:avLst/>
+          </a:prstGeom>
+          <a:noFill/>
+          <a:ln>
+            <a:noFill/>
+          </a:ln>
+        </p:spPr>
+        <p:txBody>
+          <a:bodyPr spcFirstLastPara="1" wrap="square" lIns="91425" tIns="45700" rIns="91425" bIns="45700" anchor="t" anchorCtr="0">
+            <a:noAutofit/>
+          </a:bodyPr>
+          <a:lstStyle/>
+          <a:p>
+            <a:pPr marL="0" lvl="0" indent="0" algn="l" rtl="0">
+              <a:spcBef>
+                <a:spcPts val="0"/>
+              </a:spcBef>
+              <a:spcAft>
+                <a:spcPts val="0"/>
+              </a:spcAft>
+              <a:buNone/>
+            </a:pPr>
+            <a:r>
+              <a:rPr lang="en-US"/>
+              <a:t>DEMO – code formatting, ect. </a:t>
+            </a:r>
+            <a:endParaRPr/>
+          </a:p>
+        </p:txBody>
+      </p:sp>
+      <p:sp>
+        <p:nvSpPr>
+          <p:cNvPr id="147" name="Google Shape;147;p8:notes"/>
+          <p:cNvSpPr txBox="1">
+            <a:spLocks noGrp="1"/>
+          </p:cNvSpPr>
+          <p:nvPr>
+            <p:ph type="sldNum" idx="12"/>
+          </p:nvPr>
+        </p:nvSpPr>
+        <p:spPr>
+          <a:xfrm>
+            <a:off x="3884613" y="8685213"/>
+            <a:ext cx="2971800" cy="458787"/>
+          </a:xfrm>
+          <a:prstGeom prst="rect">
+            <a:avLst/>
+          </a:prstGeom>
+          <a:noFill/>
+          <a:ln>
+            <a:noFill/>
+          </a:ln>
+        </p:spPr>
+        <p:txBody>
+          <a:bodyPr spcFirstLastPara="1" wrap="square" lIns="91425" tIns="45700" rIns="91425" bIns="45700" anchor="b" anchorCtr="0">
+            <a:noAutofit/>
+          </a:bodyPr>
+          <a:lstStyle/>
+          <a:p>
+            <a:pPr marL="0" lvl="0" indent="0" algn="r" rtl="0">
+              <a:spcBef>
+                <a:spcPts val="0"/>
+              </a:spcBef>
+              <a:spcAft>
+                <a:spcPts val="0"/>
+              </a:spcAft>
+              <a:buNone/>
+            </a:pPr>
+            <a:fld id="{00000000-1234-1234-1234-123412341234}" type="slidenum">
+              <a:rPr lang="en-US"/>
+              <a:t>11</a:t>
+            </a:fld>
+            <a:endParaRPr/>
+          </a:p>
+        </p:txBody>
+      </p:sp>
+    </p:spTree>
+  </p:cSld>
+  <p:clrMapOvr>
+    <a:masterClrMapping/>
+  </p:clrMapOvr>
+</p:notes>
+</file>
+
+<file path=ppt/notesSlides/notesSlide11.xml><?xml version="1.0" encoding="utf-8"?>
+<p:notes xmlns:a="http://schemas.openxmlformats.org/drawingml/2006/main" xmlns:r="http://schemas.openxmlformats.org/officeDocument/2006/relationships" xmlns:p="http://schemas.openxmlformats.org/presentationml/2006/main" showMasterSp="0" showMasterPhAnim="0">
+  <p:cSld>
+    <p:spTree>
+      <p:nvGrpSpPr>
         <p:cNvPr id="1" name="Shape 151"/>
         <p:cNvGrpSpPr/>
         <p:nvPr/>
@@ -1760,7 +1931,7 @@
 </p:notes>
 </file>
 
-<file path=ppt/notesSlides/notesSlide11.xml><?xml version="1.0" encoding="utf-8"?>
+<file path=ppt/notesSlides/notesSlide12.xml><?xml version="1.0" encoding="utf-8"?>
 <p:notes xmlns:a="http://schemas.openxmlformats.org/drawingml/2006/main" xmlns:r="http://schemas.openxmlformats.org/officeDocument/2006/relationships" xmlns:p="http://schemas.openxmlformats.org/presentationml/2006/main" showMasterSp="0" showMasterPhAnim="0">
   <p:cSld>
     <p:spTree>
@@ -2020,7 +2191,7 @@
 </p:notes>
 </file>
 
-<file path=ppt/notesSlides/notesSlide12.xml><?xml version="1.0" encoding="utf-8"?>
+<file path=ppt/notesSlides/notesSlide13.xml><?xml version="1.0" encoding="utf-8"?>
 <p:notes xmlns:a="http://schemas.openxmlformats.org/drawingml/2006/main" xmlns:r="http://schemas.openxmlformats.org/officeDocument/2006/relationships" xmlns:p="http://schemas.openxmlformats.org/presentationml/2006/main" showMasterSp="0" showMasterPhAnim="0">
   <p:cSld>
     <p:spTree>
@@ -2216,7 +2387,7 @@
 </p:notes>
 </file>
 
-<file path=ppt/notesSlides/notesSlide13.xml><?xml version="1.0" encoding="utf-8"?>
+<file path=ppt/notesSlides/notesSlide14.xml><?xml version="1.0" encoding="utf-8"?>
 <p:notes xmlns:a="http://schemas.openxmlformats.org/drawingml/2006/main" xmlns:r="http://schemas.openxmlformats.org/officeDocument/2006/relationships" xmlns:p="http://schemas.openxmlformats.org/presentationml/2006/main" showMasterSp="0" showMasterPhAnim="0">
   <p:cSld>
     <p:spTree>
@@ -2320,7 +2491,7 @@
 </p:notes>
 </file>
 
-<file path=ppt/notesSlides/notesSlide14.xml><?xml version="1.0" encoding="utf-8"?>
+<file path=ppt/notesSlides/notesSlide15.xml><?xml version="1.0" encoding="utf-8"?>
 <p:notes xmlns:a="http://schemas.openxmlformats.org/drawingml/2006/main" xmlns:r="http://schemas.openxmlformats.org/officeDocument/2006/relationships" xmlns:p="http://schemas.openxmlformats.org/presentationml/2006/main" showMasterSp="0" showMasterPhAnim="0">
   <p:cSld>
     <p:spTree>
@@ -2488,7 +2659,7 @@
 </p:notes>
 </file>
 
-<file path=ppt/notesSlides/notesSlide15.xml><?xml version="1.0" encoding="utf-8"?>
+<file path=ppt/notesSlides/notesSlide16.xml><?xml version="1.0" encoding="utf-8"?>
 <p:notes xmlns:a="http://schemas.openxmlformats.org/drawingml/2006/main" xmlns:r="http://schemas.openxmlformats.org/officeDocument/2006/relationships" xmlns:p="http://schemas.openxmlformats.org/presentationml/2006/main" showMasterSp="0" showMasterPhAnim="0">
   <p:cSld>
     <p:spTree>
@@ -2740,7 +2911,7 @@
 </p:notes>
 </file>
 
-<file path=ppt/notesSlides/notesSlide16.xml><?xml version="1.0" encoding="utf-8"?>
+<file path=ppt/notesSlides/notesSlide17.xml><?xml version="1.0" encoding="utf-8"?>
 <p:notes xmlns:a="http://schemas.openxmlformats.org/drawingml/2006/main" xmlns:r="http://schemas.openxmlformats.org/officeDocument/2006/relationships" xmlns:p="http://schemas.openxmlformats.org/presentationml/2006/main" showMasterSp="0" showMasterPhAnim="0">
   <p:cSld>
     <p:spTree>
@@ -3020,7 +3191,7 @@
 </p:notes>
 </file>
 
-<file path=ppt/notesSlides/notesSlide17.xml><?xml version="1.0" encoding="utf-8"?>
+<file path=ppt/notesSlides/notesSlide18.xml><?xml version="1.0" encoding="utf-8"?>
 <p:notes xmlns:a="http://schemas.openxmlformats.org/drawingml/2006/main" xmlns:r="http://schemas.openxmlformats.org/officeDocument/2006/relationships" xmlns:p="http://schemas.openxmlformats.org/presentationml/2006/main" showMasterSp="0" showMasterPhAnim="0">
   <p:cSld>
     <p:spTree>
@@ -3188,7 +3359,7 @@
 </p:notes>
 </file>
 
-<file path=ppt/notesSlides/notesSlide18.xml><?xml version="1.0" encoding="utf-8"?>
+<file path=ppt/notesSlides/notesSlide19.xml><?xml version="1.0" encoding="utf-8"?>
 <p:notes xmlns:a="http://schemas.openxmlformats.org/drawingml/2006/main" xmlns:r="http://schemas.openxmlformats.org/officeDocument/2006/relationships" xmlns:p="http://schemas.openxmlformats.org/presentationml/2006/main" showMasterSp="0" showMasterPhAnim="0">
   <p:cSld>
     <p:spTree>
@@ -3372,7 +3543,111 @@
 </p:notes>
 </file>
 
-<file path=ppt/notesSlides/notesSlide19.xml><?xml version="1.0" encoding="utf-8"?>
+<file path=ppt/notesSlides/notesSlide2.xml><?xml version="1.0" encoding="utf-8"?>
+<p:notes xmlns:a="http://schemas.openxmlformats.org/drawingml/2006/main" xmlns:r="http://schemas.openxmlformats.org/officeDocument/2006/relationships" xmlns:p="http://schemas.openxmlformats.org/presentationml/2006/main" showMasterSp="0" showMasterPhAnim="0">
+  <p:cSld>
+    <p:spTree>
+      <p:nvGrpSpPr>
+        <p:cNvPr id="1" name="Shape 90"/>
+        <p:cNvGrpSpPr/>
+        <p:nvPr/>
+      </p:nvGrpSpPr>
+      <p:grpSpPr>
+        <a:xfrm>
+          <a:off x="0" y="0"/>
+          <a:ext cx="0" cy="0"/>
+          <a:chOff x="0" y="0"/>
+          <a:chExt cx="0" cy="0"/>
+        </a:xfrm>
+      </p:grpSpPr>
+      <p:sp>
+        <p:nvSpPr>
+          <p:cNvPr id="91" name="Google Shape;91;p2:notes"/>
+          <p:cNvSpPr txBox="1">
+            <a:spLocks noGrp="1"/>
+          </p:cNvSpPr>
+          <p:nvPr>
+            <p:ph type="body" idx="1"/>
+          </p:nvPr>
+        </p:nvSpPr>
+        <p:spPr>
+          <a:xfrm>
+            <a:off x="685800" y="4400550"/>
+            <a:ext cx="5486400" cy="3600450"/>
+          </a:xfrm>
+          <a:prstGeom prst="rect">
+            <a:avLst/>
+          </a:prstGeom>
+        </p:spPr>
+        <p:txBody>
+          <a:bodyPr spcFirstLastPara="1" wrap="square" lIns="91425" tIns="45700" rIns="91425" bIns="45700" anchor="t" anchorCtr="0">
+            <a:noAutofit/>
+          </a:bodyPr>
+          <a:lstStyle/>
+          <a:p>
+            <a:pPr marL="0" lvl="0" indent="0" algn="l" rtl="0">
+              <a:spcBef>
+                <a:spcPts val="0"/>
+              </a:spcBef>
+              <a:spcAft>
+                <a:spcPts val="0"/>
+              </a:spcAft>
+              <a:buNone/>
+            </a:pPr>
+            <a:endParaRPr/>
+          </a:p>
+        </p:txBody>
+      </p:sp>
+      <p:sp>
+        <p:nvSpPr>
+          <p:cNvPr id="92" name="Google Shape;92;p2:notes"/>
+          <p:cNvSpPr>
+            <a:spLocks noGrp="1" noRot="1" noChangeAspect="1"/>
+          </p:cNvSpPr>
+          <p:nvPr>
+            <p:ph type="sldImg" idx="2"/>
+          </p:nvPr>
+        </p:nvSpPr>
+        <p:spPr>
+          <a:xfrm>
+            <a:off x="685800" y="1143000"/>
+            <a:ext cx="5486400" cy="3086100"/>
+          </a:xfrm>
+          <a:custGeom>
+            <a:avLst/>
+            <a:gdLst/>
+            <a:ahLst/>
+            <a:cxnLst/>
+            <a:rect l="l" t="t" r="r" b="b"/>
+            <a:pathLst>
+              <a:path w="120000" h="120000" extrusionOk="0">
+                <a:moveTo>
+                  <a:pt x="0" y="0"/>
+                </a:moveTo>
+                <a:lnTo>
+                  <a:pt x="120000" y="0"/>
+                </a:lnTo>
+                <a:lnTo>
+                  <a:pt x="120000" y="120000"/>
+                </a:lnTo>
+                <a:lnTo>
+                  <a:pt x="0" y="120000"/>
+                </a:lnTo>
+                <a:close/>
+              </a:path>
+            </a:pathLst>
+          </a:custGeom>
+        </p:spPr>
+      </p:sp>
+    </p:spTree>
+  </p:cSld>
+  <p:clrMapOvr>
+    <a:masterClrMapping/>
+  </p:clrMapOvr>
+</p:notes>
+</file>
+
+<file path=ppt/notesSlides/notesSlide20.xml><?xml version="1.0" encoding="utf-8"?>
 <p:notes xmlns:a="http://schemas.openxmlformats.org/drawingml/2006/main" xmlns:r="http://schemas.openxmlformats.org/officeDocument/2006/relationships" xmlns:p="http://schemas.openxmlformats.org/presentationml/2006/main" showMasterSp="0" showMasterPhAnim="0">
   <p:cSld>
     <p:spTree>
@@ -3604,111 +3879,7 @@
 </p:notes>
 </file>
 
-<file path=ppt/notesSlides/notesSlide2.xml><?xml version="1.0" encoding="utf-8"?>
-<p:notes xmlns:a="http://schemas.openxmlformats.org/drawingml/2006/main" xmlns:r="http://schemas.openxmlformats.org/officeDocument/2006/relationships" xmlns:p="http://schemas.openxmlformats.org/presentationml/2006/main" showMasterSp="0" showMasterPhAnim="0">
-  <p:cSld>
-    <p:spTree>
-      <p:nvGrpSpPr>
-        <p:cNvPr id="1" name="Shape 90"/>
-        <p:cNvGrpSpPr/>
-        <p:nvPr/>
-      </p:nvGrpSpPr>
-      <p:grpSpPr>
-        <a:xfrm>
-          <a:off x="0" y="0"/>
-          <a:ext cx="0" cy="0"/>
-          <a:chOff x="0" y="0"/>
-          <a:chExt cx="0" cy="0"/>
-        </a:xfrm>
-      </p:grpSpPr>
-      <p:sp>
-        <p:nvSpPr>
-          <p:cNvPr id="91" name="Google Shape;91;p2:notes"/>
-          <p:cNvSpPr txBox="1">
-            <a:spLocks noGrp="1"/>
-          </p:cNvSpPr>
-          <p:nvPr>
-            <p:ph type="body" idx="1"/>
-          </p:nvPr>
-        </p:nvSpPr>
-        <p:spPr>
-          <a:xfrm>
-            <a:off x="685800" y="4400550"/>
-            <a:ext cx="5486400" cy="3600450"/>
-          </a:xfrm>
-          <a:prstGeom prst="rect">
-            <a:avLst/>
-          </a:prstGeom>
-        </p:spPr>
-        <p:txBody>
-          <a:bodyPr spcFirstLastPara="1" wrap="square" lIns="91425" tIns="45700" rIns="91425" bIns="45700" anchor="t" anchorCtr="0">
-            <a:noAutofit/>
-          </a:bodyPr>
-          <a:lstStyle/>
-          <a:p>
-            <a:pPr marL="0" lvl="0" indent="0" algn="l" rtl="0">
-              <a:spcBef>
-                <a:spcPts val="0"/>
-              </a:spcBef>
-              <a:spcAft>
-                <a:spcPts val="0"/>
-              </a:spcAft>
-              <a:buNone/>
-            </a:pPr>
-            <a:endParaRPr/>
-          </a:p>
-        </p:txBody>
-      </p:sp>
-      <p:sp>
-        <p:nvSpPr>
-          <p:cNvPr id="92" name="Google Shape;92;p2:notes"/>
-          <p:cNvSpPr>
-            <a:spLocks noGrp="1" noRot="1" noChangeAspect="1"/>
-          </p:cNvSpPr>
-          <p:nvPr>
-            <p:ph type="sldImg" idx="2"/>
-          </p:nvPr>
-        </p:nvSpPr>
-        <p:spPr>
-          <a:xfrm>
-            <a:off x="685800" y="1143000"/>
-            <a:ext cx="5486400" cy="3086100"/>
-          </a:xfrm>
-          <a:custGeom>
-            <a:avLst/>
-            <a:gdLst/>
-            <a:ahLst/>
-            <a:cxnLst/>
-            <a:rect l="l" t="t" r="r" b="b"/>
-            <a:pathLst>
-              <a:path w="120000" h="120000" extrusionOk="0">
-                <a:moveTo>
-                  <a:pt x="0" y="0"/>
-                </a:moveTo>
-                <a:lnTo>
-                  <a:pt x="120000" y="0"/>
-                </a:lnTo>
-                <a:lnTo>
-                  <a:pt x="120000" y="120000"/>
-                </a:lnTo>
-                <a:lnTo>
-                  <a:pt x="0" y="120000"/>
-                </a:lnTo>
-                <a:close/>
-              </a:path>
-            </a:pathLst>
-          </a:custGeom>
-        </p:spPr>
-      </p:sp>
-    </p:spTree>
-  </p:cSld>
-  <p:clrMapOvr>
-    <a:masterClrMapping/>
-  </p:clrMapOvr>
-</p:notes>
-</file>
-
-<file path=ppt/notesSlides/notesSlide20.xml><?xml version="1.0" encoding="utf-8"?>
+<file path=ppt/notesSlides/notesSlide21.xml><?xml version="1.0" encoding="utf-8"?>
 <p:notes xmlns:a="http://schemas.openxmlformats.org/drawingml/2006/main" xmlns:r="http://schemas.openxmlformats.org/officeDocument/2006/relationships" xmlns:p="http://schemas.openxmlformats.org/presentationml/2006/main" showMasterSp="0" showMasterPhAnim="0">
   <p:cSld>
     <p:spTree>
@@ -4191,6 +4362,122 @@
 </file>
 
 <file path=ppt/notesSlides/notesSlide5.xml><?xml version="1.0" encoding="utf-8"?>
+<p:notes xmlns:a="http://schemas.openxmlformats.org/drawingml/2006/main" xmlns:r="http://schemas.openxmlformats.org/officeDocument/2006/relationships" xmlns:p="http://schemas.openxmlformats.org/presentationml/2006/main">
+  <p:cSld>
+    <p:spTree>
+      <p:nvGrpSpPr>
+        <p:cNvPr id="1" name=""/>
+        <p:cNvGrpSpPr/>
+        <p:nvPr/>
+      </p:nvGrpSpPr>
+      <p:grpSpPr>
+        <a:xfrm>
+          <a:off x="0" y="0"/>
+          <a:ext cx="0" cy="0"/>
+          <a:chOff x="0" y="0"/>
+          <a:chExt cx="0" cy="0"/>
+        </a:xfrm>
+      </p:grpSpPr>
+      <p:sp>
+        <p:nvSpPr>
+          <p:cNvPr id="2" name="Slide Image Placeholder 1"/>
+          <p:cNvSpPr>
+            <a:spLocks noGrp="1" noRot="1" noChangeAspect="1"/>
+          </p:cNvSpPr>
+          <p:nvPr>
+            <p:ph type="sldImg"/>
+          </p:nvPr>
+        </p:nvSpPr>
+        <p:spPr/>
+      </p:sp>
+      <p:sp>
+        <p:nvSpPr>
+          <p:cNvPr id="3" name="Notes Placeholder 2"/>
+          <p:cNvSpPr>
+            <a:spLocks noGrp="1"/>
+          </p:cNvSpPr>
+          <p:nvPr>
+            <p:ph type="body" idx="1"/>
+          </p:nvPr>
+        </p:nvSpPr>
+        <p:spPr/>
+        <p:txBody>
+          <a:bodyPr/>
+          <a:lstStyle/>
+          <a:p>
+            <a:r>
+              <a:rPr lang="en-US" dirty="0"/>
+              <a:t>The notebooks note where the ”lectures” will be ending and if there are sections we will not be covering in detail. We have more content than we likely will be able to cover this is so you are able to keep learning with these materials after these three days and then are able to reference these materials </a:t>
+            </a:r>
+            <a:r>
+              <a:rPr lang="en-US"/>
+              <a:t>for future use. </a:t>
+            </a:r>
+          </a:p>
+        </p:txBody>
+      </p:sp>
+      <p:sp>
+        <p:nvSpPr>
+          <p:cNvPr id="4" name="Slide Number Placeholder 3"/>
+          <p:cNvSpPr>
+            <a:spLocks noGrp="1"/>
+          </p:cNvSpPr>
+          <p:nvPr>
+            <p:ph type="sldNum" idx="12"/>
+          </p:nvPr>
+        </p:nvSpPr>
+        <p:spPr/>
+        <p:txBody>
+          <a:bodyPr/>
+          <a:lstStyle/>
+          <a:p>
+            <a:pPr marL="0" marR="0" lvl="0" indent="0" algn="r" rtl="0">
+              <a:spcBef>
+                <a:spcPts val="0"/>
+              </a:spcBef>
+              <a:spcAft>
+                <a:spcPts val="0"/>
+              </a:spcAft>
+              <a:buNone/>
+            </a:pPr>
+            <a:fld id="{00000000-1234-1234-1234-123412341234}" type="slidenum">
+              <a:rPr lang="en-US" sz="1200" b="0" i="0" u="none" strike="noStrike" cap="none" smtClean="0">
+                <a:solidFill>
+                  <a:schemeClr val="dk1"/>
+                </a:solidFill>
+                <a:latin typeface="Calibri"/>
+                <a:ea typeface="Calibri"/>
+                <a:cs typeface="Calibri"/>
+                <a:sym typeface="Calibri"/>
+              </a:rPr>
+              <a:t>6</a:t>
+            </a:fld>
+            <a:endParaRPr lang="en-US" sz="1200" b="0" i="0" u="none" strike="noStrike" cap="none">
+              <a:solidFill>
+                <a:schemeClr val="dk1"/>
+              </a:solidFill>
+              <a:latin typeface="Calibri"/>
+              <a:ea typeface="Calibri"/>
+              <a:cs typeface="Calibri"/>
+              <a:sym typeface="Calibri"/>
+            </a:endParaRPr>
+          </a:p>
+        </p:txBody>
+      </p:sp>
+    </p:spTree>
+    <p:extLst>
+      <p:ext uri="{BB962C8B-B14F-4D97-AF65-F5344CB8AC3E}">
+        <p14:creationId xmlns:p14="http://schemas.microsoft.com/office/powerpoint/2010/main" val="927985503"/>
+      </p:ext>
+    </p:extLst>
+  </p:cSld>
+  <p:clrMapOvr>
+    <a:masterClrMapping/>
+  </p:clrMapOvr>
+</p:notes>
+</file>
+
+<file path=ppt/notesSlides/notesSlide6.xml><?xml version="1.0" encoding="utf-8"?>
 <p:notes xmlns:a="http://schemas.openxmlformats.org/drawingml/2006/main" xmlns:r="http://schemas.openxmlformats.org/officeDocument/2006/relationships" xmlns:p="http://schemas.openxmlformats.org/presentationml/2006/main" showMasterSp="0" showMasterPhAnim="0">
   <p:cSld>
     <p:spTree>
@@ -4358,7 +4645,7 @@
 </p:notes>
 </file>
 
-<file path=ppt/notesSlides/notesSlide6.xml><?xml version="1.0" encoding="utf-8"?>
+<file path=ppt/notesSlides/notesSlide7.xml><?xml version="1.0" encoding="utf-8"?>
 <p:notes xmlns:a="http://schemas.openxmlformats.org/drawingml/2006/main" xmlns:r="http://schemas.openxmlformats.org/officeDocument/2006/relationships" xmlns:p="http://schemas.openxmlformats.org/presentationml/2006/main" showMasterSp="0" showMasterPhAnim="0">
   <p:cSld>
     <p:spTree>
@@ -4526,7 +4813,7 @@
 </p:notes>
 </file>
 
-<file path=ppt/notesSlides/notesSlide7.xml><?xml version="1.0" encoding="utf-8"?>
+<file path=ppt/notesSlides/notesSlide8.xml><?xml version="1.0" encoding="utf-8"?>
 <p:notes xmlns:a="http://schemas.openxmlformats.org/drawingml/2006/main" xmlns:r="http://schemas.openxmlformats.org/officeDocument/2006/relationships" xmlns:p="http://schemas.openxmlformats.org/presentationml/2006/main" showMasterSp="0" showMasterPhAnim="0">
   <p:cSld>
     <p:spTree>
@@ -4690,7 +4977,7 @@
 </p:notes>
 </file>
 
-<file path=ppt/notesSlides/notesSlide8.xml><?xml version="1.0" encoding="utf-8"?>
+<file path=ppt/notesSlides/notesSlide9.xml><?xml version="1.0" encoding="utf-8"?>
 <p:notes xmlns:a="http://schemas.openxmlformats.org/drawingml/2006/main" xmlns:r="http://schemas.openxmlformats.org/officeDocument/2006/relationships" xmlns:p="http://schemas.openxmlformats.org/presentationml/2006/main" showMasterSp="0" showMasterPhAnim="0">
   <p:cSld>
     <p:spTree>
@@ -4785,174 +5072,6 @@
             </a:pathLst>
           </a:custGeom>
         </p:spPr>
-      </p:sp>
-    </p:spTree>
-  </p:cSld>
-  <p:clrMapOvr>
-    <a:masterClrMapping/>
-  </p:clrMapOvr>
-</p:notes>
-</file>
-
-<file path=ppt/notesSlides/notesSlide9.xml><?xml version="1.0" encoding="utf-8"?>
-<p:notes xmlns:a="http://schemas.openxmlformats.org/drawingml/2006/main" xmlns:r="http://schemas.openxmlformats.org/officeDocument/2006/relationships" xmlns:p="http://schemas.openxmlformats.org/presentationml/2006/main" showMasterSp="0" showMasterPhAnim="0">
-  <p:cSld>
-    <p:spTree>
-      <p:nvGrpSpPr>
-        <p:cNvPr id="1" name="Shape 144"/>
-        <p:cNvGrpSpPr/>
-        <p:nvPr/>
-      </p:nvGrpSpPr>
-      <p:grpSpPr>
-        <a:xfrm>
-          <a:off x="0" y="0"/>
-          <a:ext cx="0" cy="0"/>
-          <a:chOff x="0" y="0"/>
-          <a:chExt cx="0" cy="0"/>
-        </a:xfrm>
-      </p:grpSpPr>
-      <p:sp>
-        <p:nvSpPr>
-          <p:cNvPr id="145" name="Google Shape;145;p8:notes"/>
-          <p:cNvSpPr>
-            <a:spLocks noGrp="1" noRot="1" noChangeAspect="1"/>
-          </p:cNvSpPr>
-          <p:nvPr>
-            <p:ph type="sldImg" idx="2"/>
-          </p:nvPr>
-        </p:nvSpPr>
-        <p:spPr>
-          <a:xfrm>
-            <a:off x="685800" y="1143000"/>
-            <a:ext cx="5486400" cy="3086100"/>
-          </a:xfrm>
-          <a:custGeom>
-            <a:avLst/>
-            <a:gdLst/>
-            <a:ahLst/>
-            <a:cxnLst/>
-            <a:rect l="l" t="t" r="r" b="b"/>
-            <a:pathLst>
-              <a:path w="120000" h="120000" extrusionOk="0">
-                <a:moveTo>
-                  <a:pt x="0" y="0"/>
-                </a:moveTo>
-                <a:lnTo>
-                  <a:pt x="120000" y="0"/>
-                </a:lnTo>
-                <a:lnTo>
-                  <a:pt x="120000" y="120000"/>
-                </a:lnTo>
-                <a:lnTo>
-                  <a:pt x="0" y="120000"/>
-                </a:lnTo>
-                <a:close/>
-              </a:path>
-            </a:pathLst>
-          </a:custGeom>
-          <a:noFill/>
-          <a:ln w="12700" cap="flat" cmpd="sng">
-            <a:solidFill>
-              <a:srgbClr val="000000"/>
-            </a:solidFill>
-            <a:prstDash val="solid"/>
-            <a:round/>
-            <a:headEnd type="none" w="sm" len="sm"/>
-            <a:tailEnd type="none" w="sm" len="sm"/>
-          </a:ln>
-        </p:spPr>
-      </p:sp>
-      <p:sp>
-        <p:nvSpPr>
-          <p:cNvPr id="146" name="Google Shape;146;p8:notes"/>
-          <p:cNvSpPr txBox="1">
-            <a:spLocks noGrp="1"/>
-          </p:cNvSpPr>
-          <p:nvPr>
-            <p:ph type="body" idx="1"/>
-          </p:nvPr>
-        </p:nvSpPr>
-        <p:spPr>
-          <a:xfrm>
-            <a:off x="685800" y="4400550"/>
-            <a:ext cx="5486400" cy="3600450"/>
-          </a:xfrm>
-          <a:prstGeom prst="rect">
-            <a:avLst/>
-          </a:prstGeom>
-          <a:noFill/>
-          <a:ln>
-            <a:noFill/>
-          </a:ln>
-        </p:spPr>
-        <p:txBody>
-          <a:bodyPr spcFirstLastPara="1" wrap="square" lIns="91425" tIns="45700" rIns="91425" bIns="45700" anchor="t" anchorCtr="0">
-            <a:noAutofit/>
-          </a:bodyPr>
-          <a:lstStyle/>
-          <a:p>
-            <a:pPr marL="0" lvl="0" indent="0" algn="l" rtl="0">
-              <a:spcBef>
-                <a:spcPts val="0"/>
-              </a:spcBef>
-              <a:spcAft>
-                <a:spcPts val="0"/>
-              </a:spcAft>
-              <a:buNone/>
-            </a:pPr>
-            <a:r>
-              <a:rPr lang="en-US"/>
-              <a:t>DEMO – code formatting, ect. </a:t>
-            </a:r>
-            <a:endParaRPr/>
-          </a:p>
-        </p:txBody>
-      </p:sp>
-      <p:sp>
-        <p:nvSpPr>
-          <p:cNvPr id="147" name="Google Shape;147;p8:notes"/>
-          <p:cNvSpPr txBox="1">
-            <a:spLocks noGrp="1"/>
-          </p:cNvSpPr>
-          <p:nvPr>
-            <p:ph type="sldNum" idx="12"/>
-          </p:nvPr>
-        </p:nvSpPr>
-        <p:spPr>
-          <a:xfrm>
-            <a:off x="3884613" y="8685213"/>
-            <a:ext cx="2971800" cy="458787"/>
-          </a:xfrm>
-          <a:prstGeom prst="rect">
-            <a:avLst/>
-          </a:prstGeom>
-          <a:noFill/>
-          <a:ln>
-            <a:noFill/>
-          </a:ln>
-        </p:spPr>
-        <p:txBody>
-          <a:bodyPr spcFirstLastPara="1" wrap="square" lIns="91425" tIns="45700" rIns="91425" bIns="45700" anchor="b" anchorCtr="0">
-            <a:noAutofit/>
-          </a:bodyPr>
-          <a:lstStyle/>
-          <a:p>
-            <a:pPr marL="0" lvl="0" indent="0" algn="r" rtl="0">
-              <a:spcBef>
-                <a:spcPts val="0"/>
-              </a:spcBef>
-              <a:spcAft>
-                <a:spcPts val="0"/>
-              </a:spcAft>
-              <a:buNone/>
-            </a:pPr>
-            <a:fld id="{00000000-1234-1234-1234-123412341234}" type="slidenum">
-              <a:rPr lang="en-US"/>
-              <a:t>11</a:t>
-            </a:fld>
-            <a:endParaRPr/>
-          </a:p>
-        </p:txBody>
       </p:sp>
     </p:spTree>
   </p:cSld>

</xml_diff>

<commit_message>
slides, notebooks for March
</commit_message>
<xml_diff>
--- a/workshop_documents/Introduction_workshop_slides.pptx
+++ b/workshop_documents/Introduction_workshop_slides.pptx
@@ -4150,10 +4150,37 @@
               <a:buNone/>
             </a:pPr>
             <a:r>
-              <a:rPr lang="en-US"/>
+              <a:rPr lang="en-US" dirty="0"/>
               <a:t>Go to canvas and explain the idea and outline then progress through it – explain the PDFs, Data files, Live notebooks</a:t>
             </a:r>
-            <a:endParaRPr/>
+          </a:p>
+          <a:p>
+            <a:pPr marL="0" lvl="0" indent="0" algn="l" rtl="0">
+              <a:spcBef>
+                <a:spcPts val="0"/>
+              </a:spcBef>
+              <a:spcAft>
+                <a:spcPts val="0"/>
+              </a:spcAft>
+              <a:buNone/>
+            </a:pPr>
+            <a:endParaRPr lang="en-US" dirty="0"/>
+          </a:p>
+          <a:p>
+            <a:pPr marL="0" lvl="0" indent="0" algn="l" rtl="0">
+              <a:spcBef>
+                <a:spcPts val="0"/>
+              </a:spcBef>
+              <a:spcAft>
+                <a:spcPts val="0"/>
+              </a:spcAft>
+              <a:buNone/>
+            </a:pPr>
+            <a:r>
+              <a:rPr lang="en-US" dirty="0"/>
+              <a:t>How long all this takes will vary </a:t>
+            </a:r>
+            <a:endParaRPr dirty="0"/>
           </a:p>
         </p:txBody>
       </p:sp>
@@ -15610,8 +15637,8 @@
         </p:nvSpPr>
         <p:spPr>
           <a:xfrm>
-            <a:off x="838200" y="740211"/>
-            <a:ext cx="7530685" cy="3163864"/>
+            <a:off x="0" y="-127141"/>
+            <a:ext cx="7530685" cy="1120590"/>
           </a:xfrm>
           <a:prstGeom prst="rect">
             <a:avLst/>
@@ -15638,9 +15665,9 @@
               <a:buNone/>
             </a:pPr>
             <a:r>
-              <a:rPr lang="en-US" sz="5200">
+              <a:rPr lang="en-US" sz="5200" dirty="0">
                 <a:solidFill>
-                  <a:srgbClr val="FFFFFF"/>
+                  <a:schemeClr val="tx1"/>
                 </a:solidFill>
               </a:rPr>
               <a:t>BIOF 085 Introduction</a:t>
@@ -15660,7 +15687,7 @@
         </p:nvSpPr>
         <p:spPr>
           <a:xfrm>
-            <a:off x="838200" y="4074515"/>
+            <a:off x="0" y="867676"/>
             <a:ext cx="7583133" cy="1279124"/>
           </a:xfrm>
           <a:prstGeom prst="rect">
@@ -15687,9 +15714,9 @@
               <a:buNone/>
             </a:pPr>
             <a:r>
-              <a:rPr lang="en-US" sz="2200">
+              <a:rPr lang="en-US" sz="2200" dirty="0">
                 <a:solidFill>
-                  <a:srgbClr val="FFFFFF"/>
+                  <a:schemeClr val="tx1"/>
                 </a:solidFill>
               </a:rPr>
               <a:t>Instructors: Gaby Gerlach and Roshni Bhatt </a:t>
@@ -15709,7 +15736,7 @@
               <a:buSzPts val="2400"/>
               <a:buNone/>
             </a:pPr>
-            <a:endParaRPr lang="en-US" sz="2200">
+            <a:endParaRPr lang="en-US" sz="2200" dirty="0">
               <a:solidFill>
                 <a:srgbClr val="FFFFFF"/>
               </a:solidFill>
@@ -20565,14 +20592,14 @@
           <p:nvPr>
             <p:extLst>
               <p:ext uri="{D42A27DB-BD31-4B8C-83A1-F6EECF244321}">
-                <p14:modId xmlns:p14="http://schemas.microsoft.com/office/powerpoint/2010/main" val="3798218153"/>
+                <p14:modId xmlns:p14="http://schemas.microsoft.com/office/powerpoint/2010/main" val="1038276881"/>
               </p:ext>
             </p:extLst>
           </p:nvPr>
         </p:nvGraphicFramePr>
         <p:xfrm>
           <a:off x="838200" y="1825625"/>
-          <a:ext cx="10515625" cy="3754170"/>
+          <a:ext cx="10515625" cy="4028490"/>
         </p:xfrm>
         <a:graphic>
           <a:graphicData uri="http://schemas.openxmlformats.org/drawingml/2006/table">
@@ -20841,10 +20868,10 @@
                         <a:buNone/>
                       </a:pPr>
                       <a:r>
-                        <a:rPr lang="en-US" sz="1800"/>
+                        <a:rPr lang="en-US" sz="1800" dirty="0"/>
                         <a:t>Gaby</a:t>
                       </a:r>
-                      <a:endParaRPr/>
+                      <a:endParaRPr dirty="0"/>
                     </a:p>
                   </a:txBody>
                   <a:tcPr marL="91450" marR="91450" marT="45725" marB="45725"/>
@@ -20864,10 +20891,10 @@
                         <a:buNone/>
                       </a:pPr>
                       <a:r>
-                        <a:rPr lang="en-US" sz="1800"/>
-                        <a:t>00_python_primer</a:t>
+                        <a:rPr lang="en-US" sz="1800" dirty="0"/>
+                        <a:t>Intro slides, 00_python_primer</a:t>
                       </a:r>
-                      <a:endParaRPr sz="1800"/>
+                      <a:endParaRPr sz="1800" dirty="0"/>
                     </a:p>
                   </a:txBody>
                   <a:tcPr marL="91450" marR="91450" marT="45725" marB="45725"/>
@@ -20986,10 +21013,14 @@
                         <a:buNone/>
                       </a:pPr>
                       <a:r>
-                        <a:rPr lang="en-US" sz="1800"/>
-                        <a:t>01_python_tools</a:t>
+                        <a:rPr lang="en-US" sz="1800" dirty="0" err="1"/>
+                        <a:t>Python_objects</a:t>
                       </a:r>
-                      <a:endParaRPr sz="1800"/>
+                      <a:r>
+                        <a:rPr lang="en-US" sz="1800" dirty="0"/>
+                        <a:t> intro 01_python_tools</a:t>
+                      </a:r>
+                      <a:endParaRPr sz="1800" dirty="0"/>
                     </a:p>
                   </a:txBody>
                   <a:tcPr marL="91450" marR="91450" marT="45725" marB="45725"/>
@@ -21345,911 +21376,2542 @@
       </p:sp>
       <p:graphicFrame>
         <p:nvGraphicFramePr>
-          <p:cNvPr id="130" name="Google Shape;130;p5"/>
-          <p:cNvGraphicFramePr/>
-          <p:nvPr>
-            <p:extLst>
-              <p:ext uri="{D42A27DB-BD31-4B8C-83A1-F6EECF244321}">
-                <p14:modId xmlns:p14="http://schemas.microsoft.com/office/powerpoint/2010/main" val="127455157"/>
-              </p:ext>
-            </p:extLst>
-          </p:nvPr>
+          <p:cNvPr id="2" name="Table 1">
+            <a:extLst>
+              <a:ext uri="{FF2B5EF4-FFF2-40B4-BE49-F238E27FC236}">
+                <a16:creationId xmlns:a16="http://schemas.microsoft.com/office/drawing/2014/main" id="{8BFEABE9-2036-3843-84CE-245C06219359}"/>
+              </a:ext>
+            </a:extLst>
+          </p:cNvPr>
+          <p:cNvGraphicFramePr>
+            <a:graphicFrameLocks noGrp="1"/>
+          </p:cNvGraphicFramePr>
+          <p:nvPr/>
         </p:nvGraphicFramePr>
         <p:xfrm>
-          <a:off x="838200" y="1825625"/>
-          <a:ext cx="10515625" cy="3677990"/>
+          <a:off x="838200" y="2080777"/>
+          <a:ext cx="10515600" cy="3841033"/>
         </p:xfrm>
         <a:graphic>
           <a:graphicData uri="http://schemas.openxmlformats.org/drawingml/2006/table">
             <a:tbl>
-              <a:tblPr firstRow="1" bandRow="1">
-                <a:noFill/>
-                <a:tableStyleId>{BDC89CF2-5B3D-42B9-B6F5-01EC46F6E823}</a:tableStyleId>
-              </a:tblPr>
+              <a:tblPr/>
               <a:tblGrid>
-                <a:gridCol w="2103125">
+                <a:gridCol w="2103120">
                   <a:extLst>
                     <a:ext uri="{9D8B030D-6E8A-4147-A177-3AD203B41FA5}">
-                      <a16:colId xmlns:a16="http://schemas.microsoft.com/office/drawing/2014/main" val="20000"/>
+                      <a16:colId xmlns:a16="http://schemas.microsoft.com/office/drawing/2014/main" val="1643094191"/>
                     </a:ext>
                   </a:extLst>
                 </a:gridCol>
-                <a:gridCol w="2103125">
+                <a:gridCol w="2103120">
                   <a:extLst>
                     <a:ext uri="{9D8B030D-6E8A-4147-A177-3AD203B41FA5}">
-                      <a16:colId xmlns:a16="http://schemas.microsoft.com/office/drawing/2014/main" val="20001"/>
+                      <a16:colId xmlns:a16="http://schemas.microsoft.com/office/drawing/2014/main" val="1855105119"/>
                     </a:ext>
                   </a:extLst>
                 </a:gridCol>
-                <a:gridCol w="2103125">
+                <a:gridCol w="2103120">
                   <a:extLst>
                     <a:ext uri="{9D8B030D-6E8A-4147-A177-3AD203B41FA5}">
-                      <a16:colId xmlns:a16="http://schemas.microsoft.com/office/drawing/2014/main" val="20002"/>
+                      <a16:colId xmlns:a16="http://schemas.microsoft.com/office/drawing/2014/main" val="678389098"/>
                     </a:ext>
                   </a:extLst>
                 </a:gridCol>
-                <a:gridCol w="2103125">
+                <a:gridCol w="2103120">
                   <a:extLst>
                     <a:ext uri="{9D8B030D-6E8A-4147-A177-3AD203B41FA5}">
-                      <a16:colId xmlns:a16="http://schemas.microsoft.com/office/drawing/2014/main" val="20003"/>
+                      <a16:colId xmlns:a16="http://schemas.microsoft.com/office/drawing/2014/main" val="2618109063"/>
                     </a:ext>
                   </a:extLst>
                 </a:gridCol>
-                <a:gridCol w="2103125">
+                <a:gridCol w="2103120">
                   <a:extLst>
                     <a:ext uri="{9D8B030D-6E8A-4147-A177-3AD203B41FA5}">
-                      <a16:colId xmlns:a16="http://schemas.microsoft.com/office/drawing/2014/main" val="20004"/>
+                      <a16:colId xmlns:a16="http://schemas.microsoft.com/office/drawing/2014/main" val="3968973778"/>
                     </a:ext>
                   </a:extLst>
                 </a:gridCol>
               </a:tblGrid>
-              <a:tr h="370850">
+              <a:tr h="371139">
                 <a:tc>
                   <a:txBody>
                     <a:bodyPr/>
                     <a:lstStyle/>
                     <a:p>
-                      <a:pPr marL="0" marR="0" lvl="0" indent="0" algn="l" rtl="0">
+                      <a:pPr rtl="0" fontAlgn="t">
                         <a:spcBef>
                           <a:spcPts val="0"/>
                         </a:spcBef>
                         <a:spcAft>
                           <a:spcPts val="0"/>
                         </a:spcAft>
-                        <a:buNone/>
                       </a:pPr>
                       <a:r>
-                        <a:rPr lang="en-US" sz="1800"/>
+                        <a:rPr lang="en-US" sz="1800" b="1" i="0" u="none" strike="noStrike">
+                          <a:solidFill>
+                            <a:srgbClr val="000000"/>
+                          </a:solidFill>
+                          <a:effectLst/>
+                          <a:latin typeface="Calibri" panose="020F0502020204030204" pitchFamily="34" charset="0"/>
+                        </a:rPr>
                         <a:t>Time</a:t>
                       </a:r>
-                      <a:endParaRPr/>
+                      <a:endParaRPr lang="en-US" sz="1400">
+                        <a:effectLst/>
+                      </a:endParaRPr>
                     </a:p>
                   </a:txBody>
-                  <a:tcPr marL="91450" marR="91450" marT="45725" marB="45725"/>
+                  <a:tcPr marL="95164" marR="95164" marT="47582" marB="47582">
+                    <a:lnL w="12697" cap="flat" cmpd="sng" algn="ctr">
+                      <a:solidFill>
+                        <a:srgbClr val="000000"/>
+                      </a:solidFill>
+                      <a:prstDash val="solid"/>
+                      <a:round/>
+                      <a:headEnd type="none" w="med" len="med"/>
+                      <a:tailEnd type="none" w="med" len="med"/>
+                    </a:lnL>
+                    <a:lnR w="12697" cap="flat" cmpd="sng" algn="ctr">
+                      <a:solidFill>
+                        <a:srgbClr val="000000"/>
+                      </a:solidFill>
+                      <a:prstDash val="solid"/>
+                      <a:round/>
+                      <a:headEnd type="none" w="med" len="med"/>
+                      <a:tailEnd type="none" w="med" len="med"/>
+                    </a:lnR>
+                    <a:lnT w="12697" cap="flat" cmpd="sng" algn="ctr">
+                      <a:solidFill>
+                        <a:srgbClr val="000000"/>
+                      </a:solidFill>
+                      <a:prstDash val="solid"/>
+                      <a:round/>
+                      <a:headEnd type="none" w="med" len="med"/>
+                      <a:tailEnd type="none" w="med" len="med"/>
+                    </a:lnT>
+                    <a:lnB w="12697" cap="flat" cmpd="sng" algn="ctr">
+                      <a:solidFill>
+                        <a:srgbClr val="000000"/>
+                      </a:solidFill>
+                      <a:prstDash val="solid"/>
+                      <a:round/>
+                      <a:headEnd type="none" w="med" len="med"/>
+                      <a:tailEnd type="none" w="med" len="med"/>
+                    </a:lnB>
+                    <a:solidFill>
+                      <a:srgbClr val="E6E6E6"/>
+                    </a:solidFill>
+                  </a:tcPr>
                 </a:tc>
                 <a:tc>
                   <a:txBody>
                     <a:bodyPr/>
                     <a:lstStyle/>
                     <a:p>
-                      <a:pPr marL="0" marR="0" lvl="0" indent="0" algn="l" rtl="0">
+                      <a:pPr rtl="0" fontAlgn="t">
                         <a:spcBef>
                           <a:spcPts val="0"/>
                         </a:spcBef>
                         <a:spcAft>
                           <a:spcPts val="0"/>
                         </a:spcAft>
-                        <a:buNone/>
                       </a:pPr>
                       <a:r>
-                        <a:rPr lang="en-US" sz="1800"/>
+                        <a:rPr lang="en-US" sz="1800" b="1" i="0" u="none" strike="noStrike">
+                          <a:solidFill>
+                            <a:srgbClr val="000000"/>
+                          </a:solidFill>
+                          <a:effectLst/>
+                          <a:latin typeface="Calibri" panose="020F0502020204030204" pitchFamily="34" charset="0"/>
+                        </a:rPr>
                         <a:t>Format</a:t>
                       </a:r>
-                      <a:endParaRPr/>
+                      <a:endParaRPr lang="en-US" sz="1400">
+                        <a:effectLst/>
+                      </a:endParaRPr>
                     </a:p>
                   </a:txBody>
-                  <a:tcPr marL="91450" marR="91450" marT="45725" marB="45725"/>
+                  <a:tcPr marL="95164" marR="95164" marT="47582" marB="47582">
+                    <a:lnL w="12697" cap="flat" cmpd="sng" algn="ctr">
+                      <a:solidFill>
+                        <a:srgbClr val="000000"/>
+                      </a:solidFill>
+                      <a:prstDash val="solid"/>
+                      <a:round/>
+                      <a:headEnd type="none" w="med" len="med"/>
+                      <a:tailEnd type="none" w="med" len="med"/>
+                    </a:lnL>
+                    <a:lnR w="12697" cap="flat" cmpd="sng" algn="ctr">
+                      <a:solidFill>
+                        <a:srgbClr val="000000"/>
+                      </a:solidFill>
+                      <a:prstDash val="solid"/>
+                      <a:round/>
+                      <a:headEnd type="none" w="med" len="med"/>
+                      <a:tailEnd type="none" w="med" len="med"/>
+                    </a:lnR>
+                    <a:lnT w="12697" cap="flat" cmpd="sng" algn="ctr">
+                      <a:solidFill>
+                        <a:srgbClr val="000000"/>
+                      </a:solidFill>
+                      <a:prstDash val="solid"/>
+                      <a:round/>
+                      <a:headEnd type="none" w="med" len="med"/>
+                      <a:tailEnd type="none" w="med" len="med"/>
+                    </a:lnT>
+                    <a:lnB w="12697" cap="flat" cmpd="sng" algn="ctr">
+                      <a:solidFill>
+                        <a:srgbClr val="000000"/>
+                      </a:solidFill>
+                      <a:prstDash val="solid"/>
+                      <a:round/>
+                      <a:headEnd type="none" w="med" len="med"/>
+                      <a:tailEnd type="none" w="med" len="med"/>
+                    </a:lnB>
+                    <a:solidFill>
+                      <a:srgbClr val="E6E6E6"/>
+                    </a:solidFill>
+                  </a:tcPr>
                 </a:tc>
                 <a:tc>
                   <a:txBody>
                     <a:bodyPr/>
                     <a:lstStyle/>
                     <a:p>
-                      <a:pPr marL="0" marR="0" lvl="0" indent="0" algn="l" rtl="0">
+                      <a:pPr rtl="0" fontAlgn="t">
                         <a:spcBef>
                           <a:spcPts val="0"/>
                         </a:spcBef>
                         <a:spcAft>
                           <a:spcPts val="0"/>
                         </a:spcAft>
-                        <a:buNone/>
                       </a:pPr>
                       <a:r>
-                        <a:rPr lang="en-US" sz="1800"/>
+                        <a:rPr lang="en-US" sz="1800" b="1" i="0" u="none" strike="noStrike">
+                          <a:solidFill>
+                            <a:srgbClr val="000000"/>
+                          </a:solidFill>
+                          <a:effectLst/>
+                          <a:latin typeface="Calibri" panose="020F0502020204030204" pitchFamily="34" charset="0"/>
+                        </a:rPr>
                         <a:t>Topic</a:t>
                       </a:r>
-                      <a:endParaRPr/>
+                      <a:endParaRPr lang="en-US" sz="1400">
+                        <a:effectLst/>
+                      </a:endParaRPr>
                     </a:p>
                   </a:txBody>
-                  <a:tcPr marL="91450" marR="91450" marT="45725" marB="45725"/>
+                  <a:tcPr marL="95164" marR="95164" marT="47582" marB="47582">
+                    <a:lnL w="12697" cap="flat" cmpd="sng" algn="ctr">
+                      <a:solidFill>
+                        <a:srgbClr val="000000"/>
+                      </a:solidFill>
+                      <a:prstDash val="solid"/>
+                      <a:round/>
+                      <a:headEnd type="none" w="med" len="med"/>
+                      <a:tailEnd type="none" w="med" len="med"/>
+                    </a:lnL>
+                    <a:lnR w="12697" cap="flat" cmpd="sng" algn="ctr">
+                      <a:solidFill>
+                        <a:srgbClr val="000000"/>
+                      </a:solidFill>
+                      <a:prstDash val="solid"/>
+                      <a:round/>
+                      <a:headEnd type="none" w="med" len="med"/>
+                      <a:tailEnd type="none" w="med" len="med"/>
+                    </a:lnR>
+                    <a:lnT w="12697" cap="flat" cmpd="sng" algn="ctr">
+                      <a:solidFill>
+                        <a:srgbClr val="000000"/>
+                      </a:solidFill>
+                      <a:prstDash val="solid"/>
+                      <a:round/>
+                      <a:headEnd type="none" w="med" len="med"/>
+                      <a:tailEnd type="none" w="med" len="med"/>
+                    </a:lnT>
+                    <a:lnB w="12697" cap="flat" cmpd="sng" algn="ctr">
+                      <a:solidFill>
+                        <a:srgbClr val="000000"/>
+                      </a:solidFill>
+                      <a:prstDash val="solid"/>
+                      <a:round/>
+                      <a:headEnd type="none" w="med" len="med"/>
+                      <a:tailEnd type="none" w="med" len="med"/>
+                    </a:lnB>
+                    <a:solidFill>
+                      <a:srgbClr val="E6E6E6"/>
+                    </a:solidFill>
+                  </a:tcPr>
                 </a:tc>
                 <a:tc>
                   <a:txBody>
                     <a:bodyPr/>
                     <a:lstStyle/>
                     <a:p>
-                      <a:pPr marL="0" marR="0" lvl="0" indent="0" algn="l" rtl="0">
+                      <a:pPr rtl="0" fontAlgn="t">
                         <a:spcBef>
                           <a:spcPts val="0"/>
                         </a:spcBef>
                         <a:spcAft>
                           <a:spcPts val="0"/>
                         </a:spcAft>
-                        <a:buNone/>
                       </a:pPr>
                       <a:r>
-                        <a:rPr lang="en-US" sz="1800"/>
-                        <a:t>Instructor </a:t>
+                        <a:rPr lang="en-US" sz="1800" b="1" i="0" u="none" strike="noStrike">
+                          <a:solidFill>
+                            <a:srgbClr val="000000"/>
+                          </a:solidFill>
+                          <a:effectLst/>
+                          <a:latin typeface="Calibri" panose="020F0502020204030204" pitchFamily="34" charset="0"/>
+                        </a:rPr>
+                        <a:t>Instructor </a:t>
                       </a:r>
-                      <a:endParaRPr/>
+                      <a:endParaRPr lang="en-US" sz="1400">
+                        <a:effectLst/>
+                      </a:endParaRPr>
                     </a:p>
                   </a:txBody>
-                  <a:tcPr marL="91450" marR="91450" marT="45725" marB="45725"/>
+                  <a:tcPr marL="95164" marR="95164" marT="47582" marB="47582">
+                    <a:lnL w="12697" cap="flat" cmpd="sng" algn="ctr">
+                      <a:solidFill>
+                        <a:srgbClr val="000000"/>
+                      </a:solidFill>
+                      <a:prstDash val="solid"/>
+                      <a:round/>
+                      <a:headEnd type="none" w="med" len="med"/>
+                      <a:tailEnd type="none" w="med" len="med"/>
+                    </a:lnL>
+                    <a:lnR w="12697" cap="flat" cmpd="sng" algn="ctr">
+                      <a:solidFill>
+                        <a:srgbClr val="000000"/>
+                      </a:solidFill>
+                      <a:prstDash val="solid"/>
+                      <a:round/>
+                      <a:headEnd type="none" w="med" len="med"/>
+                      <a:tailEnd type="none" w="med" len="med"/>
+                    </a:lnR>
+                    <a:lnT w="12697" cap="flat" cmpd="sng" algn="ctr">
+                      <a:solidFill>
+                        <a:srgbClr val="000000"/>
+                      </a:solidFill>
+                      <a:prstDash val="solid"/>
+                      <a:round/>
+                      <a:headEnd type="none" w="med" len="med"/>
+                      <a:tailEnd type="none" w="med" len="med"/>
+                    </a:lnT>
+                    <a:lnB w="12697" cap="flat" cmpd="sng" algn="ctr">
+                      <a:solidFill>
+                        <a:srgbClr val="000000"/>
+                      </a:solidFill>
+                      <a:prstDash val="solid"/>
+                      <a:round/>
+                      <a:headEnd type="none" w="med" len="med"/>
+                      <a:tailEnd type="none" w="med" len="med"/>
+                    </a:lnB>
+                    <a:solidFill>
+                      <a:srgbClr val="E6E6E6"/>
+                    </a:solidFill>
+                  </a:tcPr>
                 </a:tc>
                 <a:tc>
                   <a:txBody>
                     <a:bodyPr/>
                     <a:lstStyle/>
                     <a:p>
-                      <a:pPr marL="0" marR="0" lvl="0" indent="0" algn="l" rtl="0">
+                      <a:pPr rtl="0" fontAlgn="t">
                         <a:spcBef>
                           <a:spcPts val="0"/>
                         </a:spcBef>
                         <a:spcAft>
                           <a:spcPts val="0"/>
                         </a:spcAft>
-                        <a:buNone/>
                       </a:pPr>
                       <a:r>
-                        <a:rPr lang="en-US" sz="1800"/>
+                        <a:rPr lang="en-US" sz="1800" b="1" i="0" u="none" strike="noStrike">
+                          <a:solidFill>
+                            <a:srgbClr val="000000"/>
+                          </a:solidFill>
+                          <a:effectLst/>
+                          <a:latin typeface="Calibri" panose="020F0502020204030204" pitchFamily="34" charset="0"/>
+                        </a:rPr>
                         <a:t>Resource</a:t>
                       </a:r>
-                      <a:endParaRPr sz="1800"/>
+                      <a:endParaRPr lang="en-US" sz="1400">
+                        <a:effectLst/>
+                      </a:endParaRPr>
                     </a:p>
                   </a:txBody>
-                  <a:tcPr marL="91450" marR="91450" marT="45725" marB="45725"/>
+                  <a:tcPr marL="95164" marR="95164" marT="47582" marB="47582">
+                    <a:lnL w="12697" cap="flat" cmpd="sng" algn="ctr">
+                      <a:solidFill>
+                        <a:srgbClr val="000000"/>
+                      </a:solidFill>
+                      <a:prstDash val="solid"/>
+                      <a:round/>
+                      <a:headEnd type="none" w="med" len="med"/>
+                      <a:tailEnd type="none" w="med" len="med"/>
+                    </a:lnL>
+                    <a:lnR w="12697" cap="flat" cmpd="sng" algn="ctr">
+                      <a:solidFill>
+                        <a:srgbClr val="000000"/>
+                      </a:solidFill>
+                      <a:prstDash val="solid"/>
+                      <a:round/>
+                      <a:headEnd type="none" w="med" len="med"/>
+                      <a:tailEnd type="none" w="med" len="med"/>
+                    </a:lnR>
+                    <a:lnT w="12697" cap="flat" cmpd="sng" algn="ctr">
+                      <a:solidFill>
+                        <a:srgbClr val="000000"/>
+                      </a:solidFill>
+                      <a:prstDash val="solid"/>
+                      <a:round/>
+                      <a:headEnd type="none" w="med" len="med"/>
+                      <a:tailEnd type="none" w="med" len="med"/>
+                    </a:lnT>
+                    <a:lnB w="12697" cap="flat" cmpd="sng" algn="ctr">
+                      <a:solidFill>
+                        <a:srgbClr val="000000"/>
+                      </a:solidFill>
+                      <a:prstDash val="solid"/>
+                      <a:round/>
+                      <a:headEnd type="none" w="med" len="med"/>
+                      <a:tailEnd type="none" w="med" len="med"/>
+                    </a:lnB>
+                    <a:solidFill>
+                      <a:srgbClr val="E6E6E6"/>
+                    </a:solidFill>
+                  </a:tcPr>
                 </a:tc>
                 <a:extLst>
                   <a:ext uri="{0D108BD9-81ED-4DB2-BD59-A6C34878D82A}">
-                    <a16:rowId xmlns:a16="http://schemas.microsoft.com/office/drawing/2014/main" val="10000"/>
+                    <a16:rowId xmlns:a16="http://schemas.microsoft.com/office/drawing/2014/main" val="3060584044"/>
                   </a:ext>
                 </a:extLst>
               </a:tr>
-              <a:tr h="370850">
+              <a:tr h="371139">
                 <a:tc>
                   <a:txBody>
                     <a:bodyPr/>
                     <a:lstStyle/>
                     <a:p>
-                      <a:pPr marL="0" marR="0" lvl="0" indent="0" algn="l" rtl="0">
+                      <a:pPr rtl="0" fontAlgn="t">
                         <a:spcBef>
                           <a:spcPts val="0"/>
                         </a:spcBef>
                         <a:spcAft>
                           <a:spcPts val="0"/>
                         </a:spcAft>
-                        <a:buNone/>
                       </a:pPr>
-                      <a:endParaRPr dirty="0"/>
+                      <a:r>
+                        <a:rPr lang="en-US" sz="1800" b="0" i="0" u="none" strike="noStrike">
+                          <a:solidFill>
+                            <a:srgbClr val="000000"/>
+                          </a:solidFill>
+                          <a:effectLst/>
+                          <a:latin typeface="Calibri" panose="020F0502020204030204" pitchFamily="34" charset="0"/>
+                        </a:rPr>
+                        <a:t>9am-9:30 </a:t>
+                      </a:r>
+                      <a:endParaRPr lang="en-US" sz="1400">
+                        <a:effectLst/>
+                      </a:endParaRPr>
                     </a:p>
                   </a:txBody>
-                  <a:tcPr marL="91450" marR="91450" marT="45725" marB="45725"/>
+                  <a:tcPr marL="95164" marR="95164" marT="47582" marB="47582">
+                    <a:lnL w="12697" cap="flat" cmpd="sng" algn="ctr">
+                      <a:solidFill>
+                        <a:srgbClr val="000000"/>
+                      </a:solidFill>
+                      <a:prstDash val="solid"/>
+                      <a:round/>
+                      <a:headEnd type="none" w="med" len="med"/>
+                      <a:tailEnd type="none" w="med" len="med"/>
+                    </a:lnL>
+                    <a:lnR w="12697" cap="flat" cmpd="sng" algn="ctr">
+                      <a:solidFill>
+                        <a:srgbClr val="000000"/>
+                      </a:solidFill>
+                      <a:prstDash val="solid"/>
+                      <a:round/>
+                      <a:headEnd type="none" w="med" len="med"/>
+                      <a:tailEnd type="none" w="med" len="med"/>
+                    </a:lnR>
+                    <a:lnT w="12697" cap="flat" cmpd="sng" algn="ctr">
+                      <a:solidFill>
+                        <a:srgbClr val="000000"/>
+                      </a:solidFill>
+                      <a:prstDash val="solid"/>
+                      <a:round/>
+                      <a:headEnd type="none" w="med" len="med"/>
+                      <a:tailEnd type="none" w="med" len="med"/>
+                    </a:lnT>
+                    <a:lnB w="12697" cap="flat" cmpd="sng" algn="ctr">
+                      <a:solidFill>
+                        <a:srgbClr val="000000"/>
+                      </a:solidFill>
+                      <a:prstDash val="solid"/>
+                      <a:round/>
+                      <a:headEnd type="none" w="med" len="med"/>
+                      <a:tailEnd type="none" w="med" len="med"/>
+                    </a:lnB>
+                    <a:solidFill>
+                      <a:srgbClr val="CACACA"/>
+                    </a:solidFill>
+                  </a:tcPr>
                 </a:tc>
                 <a:tc>
                   <a:txBody>
                     <a:bodyPr/>
                     <a:lstStyle/>
                     <a:p>
-                      <a:pPr marL="0" marR="0" lvl="0" indent="0" algn="l" rtl="0">
+                      <a:pPr rtl="0" fontAlgn="t">
                         <a:spcBef>
                           <a:spcPts val="0"/>
                         </a:spcBef>
                         <a:spcAft>
                           <a:spcPts val="0"/>
                         </a:spcAft>
-                        <a:buNone/>
                       </a:pPr>
-                      <a:endParaRPr/>
+                      <a:r>
+                        <a:rPr lang="en-US" sz="1800" b="0" i="0" u="none" strike="noStrike">
+                          <a:solidFill>
+                            <a:srgbClr val="000000"/>
+                          </a:solidFill>
+                          <a:effectLst/>
+                          <a:latin typeface="Calibri" panose="020F0502020204030204" pitchFamily="34" charset="0"/>
+                        </a:rPr>
+                        <a:t>Q &amp;A</a:t>
+                      </a:r>
+                      <a:endParaRPr lang="en-US" sz="1400">
+                        <a:effectLst/>
+                      </a:endParaRPr>
                     </a:p>
                   </a:txBody>
-                  <a:tcPr marL="91450" marR="91450" marT="45725" marB="45725"/>
+                  <a:tcPr marL="95164" marR="95164" marT="47582" marB="47582">
+                    <a:lnL w="12697" cap="flat" cmpd="sng" algn="ctr">
+                      <a:solidFill>
+                        <a:srgbClr val="000000"/>
+                      </a:solidFill>
+                      <a:prstDash val="solid"/>
+                      <a:round/>
+                      <a:headEnd type="none" w="med" len="med"/>
+                      <a:tailEnd type="none" w="med" len="med"/>
+                    </a:lnL>
+                    <a:lnR w="12697" cap="flat" cmpd="sng" algn="ctr">
+                      <a:solidFill>
+                        <a:srgbClr val="000000"/>
+                      </a:solidFill>
+                      <a:prstDash val="solid"/>
+                      <a:round/>
+                      <a:headEnd type="none" w="med" len="med"/>
+                      <a:tailEnd type="none" w="med" len="med"/>
+                    </a:lnR>
+                    <a:lnT w="12697" cap="flat" cmpd="sng" algn="ctr">
+                      <a:solidFill>
+                        <a:srgbClr val="000000"/>
+                      </a:solidFill>
+                      <a:prstDash val="solid"/>
+                      <a:round/>
+                      <a:headEnd type="none" w="med" len="med"/>
+                      <a:tailEnd type="none" w="med" len="med"/>
+                    </a:lnT>
+                    <a:lnB w="12697" cap="flat" cmpd="sng" algn="ctr">
+                      <a:solidFill>
+                        <a:srgbClr val="000000"/>
+                      </a:solidFill>
+                      <a:prstDash val="solid"/>
+                      <a:round/>
+                      <a:headEnd type="none" w="med" len="med"/>
+                      <a:tailEnd type="none" w="med" len="med"/>
+                    </a:lnB>
+                    <a:solidFill>
+                      <a:srgbClr val="CACACA"/>
+                    </a:solidFill>
+                  </a:tcPr>
                 </a:tc>
                 <a:tc>
                   <a:txBody>
                     <a:bodyPr/>
                     <a:lstStyle/>
                     <a:p>
-                      <a:pPr marL="0" marR="0" lvl="0" indent="0" algn="l" rtl="0">
+                      <a:pPr rtl="0" fontAlgn="t">
                         <a:spcBef>
                           <a:spcPts val="0"/>
                         </a:spcBef>
                         <a:spcAft>
                           <a:spcPts val="0"/>
                         </a:spcAft>
-                        <a:buNone/>
                       </a:pPr>
-                      <a:endParaRPr/>
+                      <a:r>
+                        <a:rPr lang="en-US" sz="1800" b="0" i="0" u="none" strike="noStrike">
+                          <a:solidFill>
+                            <a:srgbClr val="000000"/>
+                          </a:solidFill>
+                          <a:effectLst/>
+                          <a:latin typeface="Calibri" panose="020F0502020204030204" pitchFamily="34" charset="0"/>
+                        </a:rPr>
+                        <a:t>Day 1 material </a:t>
+                      </a:r>
+                      <a:endParaRPr lang="en-US" sz="1400">
+                        <a:effectLst/>
+                      </a:endParaRPr>
                     </a:p>
                   </a:txBody>
-                  <a:tcPr marL="91450" marR="91450" marT="45725" marB="45725"/>
+                  <a:tcPr marL="95164" marR="95164" marT="47582" marB="47582">
+                    <a:lnL w="12697" cap="flat" cmpd="sng" algn="ctr">
+                      <a:solidFill>
+                        <a:srgbClr val="000000"/>
+                      </a:solidFill>
+                      <a:prstDash val="solid"/>
+                      <a:round/>
+                      <a:headEnd type="none" w="med" len="med"/>
+                      <a:tailEnd type="none" w="med" len="med"/>
+                    </a:lnL>
+                    <a:lnR w="12697" cap="flat" cmpd="sng" algn="ctr">
+                      <a:solidFill>
+                        <a:srgbClr val="000000"/>
+                      </a:solidFill>
+                      <a:prstDash val="solid"/>
+                      <a:round/>
+                      <a:headEnd type="none" w="med" len="med"/>
+                      <a:tailEnd type="none" w="med" len="med"/>
+                    </a:lnR>
+                    <a:lnT w="12697" cap="flat" cmpd="sng" algn="ctr">
+                      <a:solidFill>
+                        <a:srgbClr val="000000"/>
+                      </a:solidFill>
+                      <a:prstDash val="solid"/>
+                      <a:round/>
+                      <a:headEnd type="none" w="med" len="med"/>
+                      <a:tailEnd type="none" w="med" len="med"/>
+                    </a:lnT>
+                    <a:lnB w="12697" cap="flat" cmpd="sng" algn="ctr">
+                      <a:solidFill>
+                        <a:srgbClr val="000000"/>
+                      </a:solidFill>
+                      <a:prstDash val="solid"/>
+                      <a:round/>
+                      <a:headEnd type="none" w="med" len="med"/>
+                      <a:tailEnd type="none" w="med" len="med"/>
+                    </a:lnB>
+                    <a:solidFill>
+                      <a:srgbClr val="CACACA"/>
+                    </a:solidFill>
+                  </a:tcPr>
                 </a:tc>
                 <a:tc>
                   <a:txBody>
                     <a:bodyPr/>
                     <a:lstStyle/>
                     <a:p>
-                      <a:pPr marL="0" marR="0" lvl="0" indent="0" algn="l" rtl="0">
+                      <a:pPr rtl="0" fontAlgn="t">
                         <a:spcBef>
                           <a:spcPts val="0"/>
                         </a:spcBef>
                         <a:spcAft>
                           <a:spcPts val="0"/>
                         </a:spcAft>
-                        <a:buNone/>
                       </a:pPr>
-                      <a:endParaRPr/>
+                      <a:r>
+                        <a:rPr lang="en-US" sz="1800" b="0" i="0" u="none" strike="noStrike">
+                          <a:solidFill>
+                            <a:srgbClr val="000000"/>
+                          </a:solidFill>
+                          <a:effectLst/>
+                          <a:latin typeface="Calibri" panose="020F0502020204030204" pitchFamily="34" charset="0"/>
+                        </a:rPr>
+                        <a:t>Gaby and Roshni</a:t>
+                      </a:r>
+                      <a:endParaRPr lang="en-US" sz="1400">
+                        <a:effectLst/>
+                      </a:endParaRPr>
                     </a:p>
                   </a:txBody>
-                  <a:tcPr marL="91450" marR="91450" marT="45725" marB="45725"/>
+                  <a:tcPr marL="95164" marR="95164" marT="47582" marB="47582">
+                    <a:lnL w="12697" cap="flat" cmpd="sng" algn="ctr">
+                      <a:solidFill>
+                        <a:srgbClr val="000000"/>
+                      </a:solidFill>
+                      <a:prstDash val="solid"/>
+                      <a:round/>
+                      <a:headEnd type="none" w="med" len="med"/>
+                      <a:tailEnd type="none" w="med" len="med"/>
+                    </a:lnL>
+                    <a:lnR w="12697" cap="flat" cmpd="sng" algn="ctr">
+                      <a:solidFill>
+                        <a:srgbClr val="000000"/>
+                      </a:solidFill>
+                      <a:prstDash val="solid"/>
+                      <a:round/>
+                      <a:headEnd type="none" w="med" len="med"/>
+                      <a:tailEnd type="none" w="med" len="med"/>
+                    </a:lnR>
+                    <a:lnT w="12697" cap="flat" cmpd="sng" algn="ctr">
+                      <a:solidFill>
+                        <a:srgbClr val="000000"/>
+                      </a:solidFill>
+                      <a:prstDash val="solid"/>
+                      <a:round/>
+                      <a:headEnd type="none" w="med" len="med"/>
+                      <a:tailEnd type="none" w="med" len="med"/>
+                    </a:lnT>
+                    <a:lnB w="12697" cap="flat" cmpd="sng" algn="ctr">
+                      <a:solidFill>
+                        <a:srgbClr val="000000"/>
+                      </a:solidFill>
+                      <a:prstDash val="solid"/>
+                      <a:round/>
+                      <a:headEnd type="none" w="med" len="med"/>
+                      <a:tailEnd type="none" w="med" len="med"/>
+                    </a:lnB>
+                    <a:solidFill>
+                      <a:srgbClr val="CACACA"/>
+                    </a:solidFill>
+                  </a:tcPr>
                 </a:tc>
                 <a:tc>
                   <a:txBody>
                     <a:bodyPr/>
                     <a:lstStyle/>
                     <a:p>
-                      <a:pPr marL="0" marR="0" lvl="0" indent="0" algn="l" rtl="0">
+                      <a:pPr fontAlgn="t"/>
+                      <a:r>
+                        <a:rPr lang="en-US" sz="1400">
+                          <a:effectLst/>
+                        </a:rPr>
+                        <a:t> </a:t>
+                      </a:r>
+                    </a:p>
+                  </a:txBody>
+                  <a:tcPr marL="95164" marR="95164" marT="47582" marB="47582">
+                    <a:lnL w="12697" cap="flat" cmpd="sng" algn="ctr">
+                      <a:solidFill>
+                        <a:srgbClr val="000000"/>
+                      </a:solidFill>
+                      <a:prstDash val="solid"/>
+                      <a:round/>
+                      <a:headEnd type="none" w="med" len="med"/>
+                      <a:tailEnd type="none" w="med" len="med"/>
+                    </a:lnL>
+                    <a:lnR w="12697" cap="flat" cmpd="sng" algn="ctr">
+                      <a:solidFill>
+                        <a:srgbClr val="000000"/>
+                      </a:solidFill>
+                      <a:prstDash val="solid"/>
+                      <a:round/>
+                      <a:headEnd type="none" w="med" len="med"/>
+                      <a:tailEnd type="none" w="med" len="med"/>
+                    </a:lnR>
+                    <a:lnT w="12697" cap="flat" cmpd="sng" algn="ctr">
+                      <a:solidFill>
+                        <a:srgbClr val="000000"/>
+                      </a:solidFill>
+                      <a:prstDash val="solid"/>
+                      <a:round/>
+                      <a:headEnd type="none" w="med" len="med"/>
+                      <a:tailEnd type="none" w="med" len="med"/>
+                    </a:lnT>
+                    <a:lnB w="12697" cap="flat" cmpd="sng" algn="ctr">
+                      <a:solidFill>
+                        <a:srgbClr val="000000"/>
+                      </a:solidFill>
+                      <a:prstDash val="solid"/>
+                      <a:round/>
+                      <a:headEnd type="none" w="med" len="med"/>
+                      <a:tailEnd type="none" w="med" len="med"/>
+                    </a:lnB>
+                    <a:solidFill>
+                      <a:srgbClr val="CACACA"/>
+                    </a:solidFill>
+                  </a:tcPr>
+                </a:tc>
+                <a:extLst>
+                  <a:ext uri="{0D108BD9-81ED-4DB2-BD59-A6C34878D82A}">
+                    <a16:rowId xmlns:a16="http://schemas.microsoft.com/office/drawing/2014/main" val="4114604617"/>
+                  </a:ext>
+                </a:extLst>
+              </a:tr>
+              <a:tr h="643307">
+                <a:tc>
+                  <a:txBody>
+                    <a:bodyPr/>
+                    <a:lstStyle/>
+                    <a:p>
+                      <a:pPr rtl="0" fontAlgn="t">
                         <a:spcBef>
                           <a:spcPts val="0"/>
                         </a:spcBef>
                         <a:spcAft>
                           <a:spcPts val="0"/>
                         </a:spcAft>
-                        <a:buNone/>
                       </a:pPr>
-                      <a:endParaRPr sz="1800" dirty="0"/>
+                      <a:r>
+                        <a:rPr lang="en-US" sz="1800" b="0" i="0" u="none" strike="noStrike">
+                          <a:solidFill>
+                            <a:srgbClr val="000000"/>
+                          </a:solidFill>
+                          <a:effectLst/>
+                          <a:latin typeface="Calibri" panose="020F0502020204030204" pitchFamily="34" charset="0"/>
+                        </a:rPr>
+                        <a:t>9:30am –10:30am</a:t>
+                      </a:r>
+                      <a:endParaRPr lang="en-US" sz="1400">
+                        <a:effectLst/>
+                      </a:endParaRPr>
                     </a:p>
                   </a:txBody>
-                  <a:tcPr marL="91450" marR="91450" marT="45725" marB="45725"/>
+                  <a:tcPr marL="95164" marR="95164" marT="47582" marB="47582">
+                    <a:lnL w="12697" cap="flat" cmpd="sng" algn="ctr">
+                      <a:solidFill>
+                        <a:srgbClr val="000000"/>
+                      </a:solidFill>
+                      <a:prstDash val="solid"/>
+                      <a:round/>
+                      <a:headEnd type="none" w="med" len="med"/>
+                      <a:tailEnd type="none" w="med" len="med"/>
+                    </a:lnL>
+                    <a:lnR w="12697" cap="flat" cmpd="sng" algn="ctr">
+                      <a:solidFill>
+                        <a:srgbClr val="000000"/>
+                      </a:solidFill>
+                      <a:prstDash val="solid"/>
+                      <a:round/>
+                      <a:headEnd type="none" w="med" len="med"/>
+                      <a:tailEnd type="none" w="med" len="med"/>
+                    </a:lnR>
+                    <a:lnT w="12697" cap="flat" cmpd="sng" algn="ctr">
+                      <a:solidFill>
+                        <a:srgbClr val="000000"/>
+                      </a:solidFill>
+                      <a:prstDash val="solid"/>
+                      <a:round/>
+                      <a:headEnd type="none" w="med" len="med"/>
+                      <a:tailEnd type="none" w="med" len="med"/>
+                    </a:lnT>
+                    <a:lnB w="12697" cap="flat" cmpd="sng" algn="ctr">
+                      <a:solidFill>
+                        <a:srgbClr val="000000"/>
+                      </a:solidFill>
+                      <a:prstDash val="solid"/>
+                      <a:round/>
+                      <a:headEnd type="none" w="med" len="med"/>
+                      <a:tailEnd type="none" w="med" len="med"/>
+                    </a:lnB>
+                    <a:solidFill>
+                      <a:srgbClr val="E6E6E6"/>
+                    </a:solidFill>
+                  </a:tcPr>
                 </a:tc>
-                <a:extLst>
-                  <a:ext uri="{0D108BD9-81ED-4DB2-BD59-A6C34878D82A}">
-                    <a16:rowId xmlns:a16="http://schemas.microsoft.com/office/drawing/2014/main" val="983131707"/>
-                  </a:ext>
-                </a:extLst>
-              </a:tr>
-              <a:tr h="370850">
                 <a:tc>
                   <a:txBody>
                     <a:bodyPr/>
                     <a:lstStyle/>
                     <a:p>
-                      <a:pPr marL="0" marR="0" lvl="0" indent="0" algn="l" rtl="0">
+                      <a:pPr rtl="0" fontAlgn="t">
                         <a:spcBef>
                           <a:spcPts val="0"/>
                         </a:spcBef>
                         <a:spcAft>
                           <a:spcPts val="0"/>
                         </a:spcAft>
-                        <a:buNone/>
                       </a:pPr>
                       <a:r>
-                        <a:rPr lang="en-US" sz="1800" dirty="0"/>
-                        <a:t>9am –10am</a:t>
+                        <a:rPr lang="en-US" sz="1800" b="0" i="0" u="none" strike="noStrike">
+                          <a:solidFill>
+                            <a:srgbClr val="000000"/>
+                          </a:solidFill>
+                          <a:effectLst/>
+                          <a:latin typeface="Calibri" panose="020F0502020204030204" pitchFamily="34" charset="0"/>
+                        </a:rPr>
+                        <a:t>In-person via zoom</a:t>
                       </a:r>
-                      <a:endParaRPr dirty="0"/>
+                      <a:endParaRPr lang="en-US" sz="1400">
+                        <a:effectLst/>
+                      </a:endParaRPr>
                     </a:p>
                   </a:txBody>
-                  <a:tcPr marL="91450" marR="91450" marT="45725" marB="45725"/>
+                  <a:tcPr marL="95164" marR="95164" marT="47582" marB="47582">
+                    <a:lnL w="12697" cap="flat" cmpd="sng" algn="ctr">
+                      <a:solidFill>
+                        <a:srgbClr val="000000"/>
+                      </a:solidFill>
+                      <a:prstDash val="solid"/>
+                      <a:round/>
+                      <a:headEnd type="none" w="med" len="med"/>
+                      <a:tailEnd type="none" w="med" len="med"/>
+                    </a:lnL>
+                    <a:lnR w="12697" cap="flat" cmpd="sng" algn="ctr">
+                      <a:solidFill>
+                        <a:srgbClr val="000000"/>
+                      </a:solidFill>
+                      <a:prstDash val="solid"/>
+                      <a:round/>
+                      <a:headEnd type="none" w="med" len="med"/>
+                      <a:tailEnd type="none" w="med" len="med"/>
+                    </a:lnR>
+                    <a:lnT w="12697" cap="flat" cmpd="sng" algn="ctr">
+                      <a:solidFill>
+                        <a:srgbClr val="000000"/>
+                      </a:solidFill>
+                      <a:prstDash val="solid"/>
+                      <a:round/>
+                      <a:headEnd type="none" w="med" len="med"/>
+                      <a:tailEnd type="none" w="med" len="med"/>
+                    </a:lnT>
+                    <a:lnB w="12697" cap="flat" cmpd="sng" algn="ctr">
+                      <a:solidFill>
+                        <a:srgbClr val="000000"/>
+                      </a:solidFill>
+                      <a:prstDash val="solid"/>
+                      <a:round/>
+                      <a:headEnd type="none" w="med" len="med"/>
+                      <a:tailEnd type="none" w="med" len="med"/>
+                    </a:lnB>
+                    <a:solidFill>
+                      <a:srgbClr val="E6E6E6"/>
+                    </a:solidFill>
+                  </a:tcPr>
                 </a:tc>
                 <a:tc>
                   <a:txBody>
                     <a:bodyPr/>
                     <a:lstStyle/>
                     <a:p>
-                      <a:pPr marL="0" marR="0" lvl="0" indent="0" algn="l" rtl="0">
+                      <a:pPr rtl="0" fontAlgn="t">
                         <a:spcBef>
                           <a:spcPts val="0"/>
                         </a:spcBef>
                         <a:spcAft>
                           <a:spcPts val="0"/>
                         </a:spcAft>
-                        <a:buNone/>
                       </a:pPr>
                       <a:r>
-                        <a:rPr lang="en-US" sz="1800"/>
-                        <a:t>In-person via zoom</a:t>
+                        <a:rPr lang="en-US" sz="1800" b="0" i="0" u="none" strike="noStrike">
+                          <a:solidFill>
+                            <a:srgbClr val="000000"/>
+                          </a:solidFill>
+                          <a:effectLst/>
+                          <a:latin typeface="Calibri" panose="020F0502020204030204" pitchFamily="34" charset="0"/>
+                        </a:rPr>
+                        <a:t>Data Visualization/Stats</a:t>
                       </a:r>
-                      <a:endParaRPr/>
+                      <a:endParaRPr lang="en-US" sz="1400">
+                        <a:effectLst/>
+                      </a:endParaRPr>
                     </a:p>
                   </a:txBody>
-                  <a:tcPr marL="91450" marR="91450" marT="45725" marB="45725"/>
+                  <a:tcPr marL="95164" marR="95164" marT="47582" marB="47582">
+                    <a:lnL w="12697" cap="flat" cmpd="sng" algn="ctr">
+                      <a:solidFill>
+                        <a:srgbClr val="000000"/>
+                      </a:solidFill>
+                      <a:prstDash val="solid"/>
+                      <a:round/>
+                      <a:headEnd type="none" w="med" len="med"/>
+                      <a:tailEnd type="none" w="med" len="med"/>
+                    </a:lnL>
+                    <a:lnR w="12697" cap="flat" cmpd="sng" algn="ctr">
+                      <a:solidFill>
+                        <a:srgbClr val="000000"/>
+                      </a:solidFill>
+                      <a:prstDash val="solid"/>
+                      <a:round/>
+                      <a:headEnd type="none" w="med" len="med"/>
+                      <a:tailEnd type="none" w="med" len="med"/>
+                    </a:lnR>
+                    <a:lnT w="12697" cap="flat" cmpd="sng" algn="ctr">
+                      <a:solidFill>
+                        <a:srgbClr val="000000"/>
+                      </a:solidFill>
+                      <a:prstDash val="solid"/>
+                      <a:round/>
+                      <a:headEnd type="none" w="med" len="med"/>
+                      <a:tailEnd type="none" w="med" len="med"/>
+                    </a:lnT>
+                    <a:lnB w="12697" cap="flat" cmpd="sng" algn="ctr">
+                      <a:solidFill>
+                        <a:srgbClr val="000000"/>
+                      </a:solidFill>
+                      <a:prstDash val="solid"/>
+                      <a:round/>
+                      <a:headEnd type="none" w="med" len="med"/>
+                      <a:tailEnd type="none" w="med" len="med"/>
+                    </a:lnB>
+                    <a:solidFill>
+                      <a:srgbClr val="E6E6E6"/>
+                    </a:solidFill>
+                  </a:tcPr>
                 </a:tc>
                 <a:tc>
                   <a:txBody>
                     <a:bodyPr/>
                     <a:lstStyle/>
                     <a:p>
-                      <a:pPr marL="0" marR="0" lvl="0" indent="0" algn="l" rtl="0">
+                      <a:pPr rtl="0" fontAlgn="t">
                         <a:spcBef>
                           <a:spcPts val="0"/>
                         </a:spcBef>
                         <a:spcAft>
                           <a:spcPts val="0"/>
                         </a:spcAft>
-                        <a:buNone/>
                       </a:pPr>
                       <a:r>
-                        <a:rPr lang="en-US" sz="1800"/>
-                        <a:t>Data Visualization</a:t>
+                        <a:rPr lang="en-US" sz="1800" b="0" i="0" u="none" strike="noStrike">
+                          <a:solidFill>
+                            <a:srgbClr val="000000"/>
+                          </a:solidFill>
+                          <a:effectLst/>
+                          <a:latin typeface="Calibri" panose="020F0502020204030204" pitchFamily="34" charset="0"/>
+                        </a:rPr>
+                        <a:t>Roshni</a:t>
                       </a:r>
-                      <a:endParaRPr/>
+                      <a:endParaRPr lang="en-US" sz="1400">
+                        <a:effectLst/>
+                      </a:endParaRPr>
                     </a:p>
                   </a:txBody>
-                  <a:tcPr marL="91450" marR="91450" marT="45725" marB="45725"/>
+                  <a:tcPr marL="95164" marR="95164" marT="47582" marB="47582">
+                    <a:lnL w="12697" cap="flat" cmpd="sng" algn="ctr">
+                      <a:solidFill>
+                        <a:srgbClr val="000000"/>
+                      </a:solidFill>
+                      <a:prstDash val="solid"/>
+                      <a:round/>
+                      <a:headEnd type="none" w="med" len="med"/>
+                      <a:tailEnd type="none" w="med" len="med"/>
+                    </a:lnL>
+                    <a:lnR w="12697" cap="flat" cmpd="sng" algn="ctr">
+                      <a:solidFill>
+                        <a:srgbClr val="000000"/>
+                      </a:solidFill>
+                      <a:prstDash val="solid"/>
+                      <a:round/>
+                      <a:headEnd type="none" w="med" len="med"/>
+                      <a:tailEnd type="none" w="med" len="med"/>
+                    </a:lnR>
+                    <a:lnT w="12697" cap="flat" cmpd="sng" algn="ctr">
+                      <a:solidFill>
+                        <a:srgbClr val="000000"/>
+                      </a:solidFill>
+                      <a:prstDash val="solid"/>
+                      <a:round/>
+                      <a:headEnd type="none" w="med" len="med"/>
+                      <a:tailEnd type="none" w="med" len="med"/>
+                    </a:lnT>
+                    <a:lnB w="12697" cap="flat" cmpd="sng" algn="ctr">
+                      <a:solidFill>
+                        <a:srgbClr val="000000"/>
+                      </a:solidFill>
+                      <a:prstDash val="solid"/>
+                      <a:round/>
+                      <a:headEnd type="none" w="med" len="med"/>
+                      <a:tailEnd type="none" w="med" len="med"/>
+                    </a:lnB>
+                    <a:solidFill>
+                      <a:srgbClr val="E6E6E6"/>
+                    </a:solidFill>
+                  </a:tcPr>
                 </a:tc>
                 <a:tc>
                   <a:txBody>
                     <a:bodyPr/>
                     <a:lstStyle/>
                     <a:p>
-                      <a:pPr marL="0" marR="0" lvl="0" indent="0" algn="l" rtl="0">
+                      <a:pPr rtl="0" fontAlgn="t">
                         <a:spcBef>
                           <a:spcPts val="0"/>
                         </a:spcBef>
                         <a:spcAft>
                           <a:spcPts val="0"/>
                         </a:spcAft>
-                        <a:buNone/>
                       </a:pPr>
                       <a:r>
-                        <a:rPr lang="en-US" sz="1800"/>
-                        <a:t>Roshni</a:t>
+                        <a:rPr lang="en-US" sz="1800" b="0" i="0" u="none" strike="noStrike" dirty="0">
+                          <a:solidFill>
+                            <a:srgbClr val="000000"/>
+                          </a:solidFill>
+                          <a:effectLst/>
+                          <a:latin typeface="Calibri" panose="020F0502020204030204" pitchFamily="34" charset="0"/>
+                        </a:rPr>
+                        <a:t>Day 2 introduction </a:t>
                       </a:r>
-                      <a:endParaRPr/>
+                      <a:endParaRPr lang="en-US" sz="1400" dirty="0">
+                        <a:effectLst/>
+                      </a:endParaRPr>
                     </a:p>
                   </a:txBody>
-                  <a:tcPr marL="91450" marR="91450" marT="45725" marB="45725"/>
+                  <a:tcPr marL="95164" marR="95164" marT="47582" marB="47582">
+                    <a:lnL w="12697" cap="flat" cmpd="sng" algn="ctr">
+                      <a:solidFill>
+                        <a:srgbClr val="000000"/>
+                      </a:solidFill>
+                      <a:prstDash val="solid"/>
+                      <a:round/>
+                      <a:headEnd type="none" w="med" len="med"/>
+                      <a:tailEnd type="none" w="med" len="med"/>
+                    </a:lnL>
+                    <a:lnR w="12697" cap="flat" cmpd="sng" algn="ctr">
+                      <a:solidFill>
+                        <a:srgbClr val="000000"/>
+                      </a:solidFill>
+                      <a:prstDash val="solid"/>
+                      <a:round/>
+                      <a:headEnd type="none" w="med" len="med"/>
+                      <a:tailEnd type="none" w="med" len="med"/>
+                    </a:lnR>
+                    <a:lnT w="12697" cap="flat" cmpd="sng" algn="ctr">
+                      <a:solidFill>
+                        <a:srgbClr val="000000"/>
+                      </a:solidFill>
+                      <a:prstDash val="solid"/>
+                      <a:round/>
+                      <a:headEnd type="none" w="med" len="med"/>
+                      <a:tailEnd type="none" w="med" len="med"/>
+                    </a:lnT>
+                    <a:lnB w="12697" cap="flat" cmpd="sng" algn="ctr">
+                      <a:solidFill>
+                        <a:srgbClr val="000000"/>
+                      </a:solidFill>
+                      <a:prstDash val="solid"/>
+                      <a:round/>
+                      <a:headEnd type="none" w="med" len="med"/>
+                      <a:tailEnd type="none" w="med" len="med"/>
+                    </a:lnB>
+                    <a:solidFill>
+                      <a:srgbClr val="E6E6E6"/>
+                    </a:solidFill>
+                  </a:tcPr>
+                </a:tc>
+                <a:extLst>
+                  <a:ext uri="{0D108BD9-81ED-4DB2-BD59-A6C34878D82A}">
+                    <a16:rowId xmlns:a16="http://schemas.microsoft.com/office/drawing/2014/main" val="3696357933"/>
+                  </a:ext>
+                </a:extLst>
+              </a:tr>
+              <a:tr h="795569">
+                <a:tc>
+                  <a:txBody>
+                    <a:bodyPr/>
+                    <a:lstStyle/>
+                    <a:p>
+                      <a:pPr rtl="0" fontAlgn="t">
+                        <a:spcBef>
+                          <a:spcPts val="0"/>
+                        </a:spcBef>
+                        <a:spcAft>
+                          <a:spcPts val="0"/>
+                        </a:spcAft>
+                      </a:pPr>
+                      <a:r>
+                        <a:rPr lang="en-US" sz="1800" b="0" i="0" u="none" strike="noStrike">
+                          <a:solidFill>
+                            <a:srgbClr val="000000"/>
+                          </a:solidFill>
+                          <a:effectLst/>
+                          <a:latin typeface="Calibri" panose="020F0502020204030204" pitchFamily="34" charset="0"/>
+                        </a:rPr>
+                        <a:t>10:30am-12:30pm</a:t>
+                      </a:r>
+                      <a:endParaRPr lang="en-US" sz="1400">
+                        <a:effectLst/>
+                      </a:endParaRPr>
+                    </a:p>
+                  </a:txBody>
+                  <a:tcPr marL="95164" marR="95164" marT="47582" marB="47582">
+                    <a:lnL w="12697" cap="flat" cmpd="sng" algn="ctr">
+                      <a:solidFill>
+                        <a:srgbClr val="000000"/>
+                      </a:solidFill>
+                      <a:prstDash val="solid"/>
+                      <a:round/>
+                      <a:headEnd type="none" w="med" len="med"/>
+                      <a:tailEnd type="none" w="med" len="med"/>
+                    </a:lnL>
+                    <a:lnR w="12697" cap="flat" cmpd="sng" algn="ctr">
+                      <a:solidFill>
+                        <a:srgbClr val="000000"/>
+                      </a:solidFill>
+                      <a:prstDash val="solid"/>
+                      <a:round/>
+                      <a:headEnd type="none" w="med" len="med"/>
+                      <a:tailEnd type="none" w="med" len="med"/>
+                    </a:lnR>
+                    <a:lnT w="12697" cap="flat" cmpd="sng" algn="ctr">
+                      <a:solidFill>
+                        <a:srgbClr val="000000"/>
+                      </a:solidFill>
+                      <a:prstDash val="solid"/>
+                      <a:round/>
+                      <a:headEnd type="none" w="med" len="med"/>
+                      <a:tailEnd type="none" w="med" len="med"/>
+                    </a:lnT>
+                    <a:lnB w="12697" cap="flat" cmpd="sng" algn="ctr">
+                      <a:solidFill>
+                        <a:srgbClr val="000000"/>
+                      </a:solidFill>
+                      <a:prstDash val="solid"/>
+                      <a:round/>
+                      <a:headEnd type="none" w="med" len="med"/>
+                      <a:tailEnd type="none" w="med" len="med"/>
+                    </a:lnB>
+                    <a:solidFill>
+                      <a:srgbClr val="CACACA"/>
+                    </a:solidFill>
+                  </a:tcPr>
                 </a:tc>
                 <a:tc>
                   <a:txBody>
                     <a:bodyPr/>
                     <a:lstStyle/>
                     <a:p>
-                      <a:pPr marL="0" marR="0" lvl="0" indent="0" algn="l" rtl="0">
+                      <a:pPr rtl="0" fontAlgn="t">
                         <a:spcBef>
                           <a:spcPts val="0"/>
                         </a:spcBef>
                         <a:spcAft>
                           <a:spcPts val="0"/>
                         </a:spcAft>
-                        <a:buNone/>
                       </a:pPr>
                       <a:r>
-                        <a:rPr lang="en-US" sz="1800"/>
-                        <a:t>03_python_vis</a:t>
+                        <a:rPr lang="en-US" sz="1800" b="0" i="0" u="none" strike="noStrike">
+                          <a:solidFill>
+                            <a:srgbClr val="000000"/>
+                          </a:solidFill>
+                          <a:effectLst/>
+                          <a:latin typeface="Calibri" panose="020F0502020204030204" pitchFamily="34" charset="0"/>
+                        </a:rPr>
+                        <a:t>Asynchronous material</a:t>
                       </a:r>
-                      <a:endParaRPr sz="1800"/>
+                      <a:endParaRPr lang="en-US" sz="1400">
+                        <a:effectLst/>
+                      </a:endParaRPr>
                     </a:p>
                   </a:txBody>
-                  <a:tcPr marL="91450" marR="91450" marT="45725" marB="45725"/>
+                  <a:tcPr marL="95164" marR="95164" marT="47582" marB="47582">
+                    <a:lnL w="12697" cap="flat" cmpd="sng" algn="ctr">
+                      <a:solidFill>
+                        <a:srgbClr val="000000"/>
+                      </a:solidFill>
+                      <a:prstDash val="solid"/>
+                      <a:round/>
+                      <a:headEnd type="none" w="med" len="med"/>
+                      <a:tailEnd type="none" w="med" len="med"/>
+                    </a:lnL>
+                    <a:lnR w="12697" cap="flat" cmpd="sng" algn="ctr">
+                      <a:solidFill>
+                        <a:srgbClr val="000000"/>
+                      </a:solidFill>
+                      <a:prstDash val="solid"/>
+                      <a:round/>
+                      <a:headEnd type="none" w="med" len="med"/>
+                      <a:tailEnd type="none" w="med" len="med"/>
+                    </a:lnR>
+                    <a:lnT w="12697" cap="flat" cmpd="sng" algn="ctr">
+                      <a:solidFill>
+                        <a:srgbClr val="000000"/>
+                      </a:solidFill>
+                      <a:prstDash val="solid"/>
+                      <a:round/>
+                      <a:headEnd type="none" w="med" len="med"/>
+                      <a:tailEnd type="none" w="med" len="med"/>
+                    </a:lnT>
+                    <a:lnB w="12697" cap="flat" cmpd="sng" algn="ctr">
+                      <a:solidFill>
+                        <a:srgbClr val="000000"/>
+                      </a:solidFill>
+                      <a:prstDash val="solid"/>
+                      <a:round/>
+                      <a:headEnd type="none" w="med" len="med"/>
+                      <a:tailEnd type="none" w="med" len="med"/>
+                    </a:lnB>
+                    <a:solidFill>
+                      <a:srgbClr val="CACACA"/>
+                    </a:solidFill>
+                  </a:tcPr>
                 </a:tc>
-                <a:extLst>
-                  <a:ext uri="{0D108BD9-81ED-4DB2-BD59-A6C34878D82A}">
-                    <a16:rowId xmlns:a16="http://schemas.microsoft.com/office/drawing/2014/main" val="10001"/>
-                  </a:ext>
-                </a:extLst>
-              </a:tr>
-              <a:tr h="370850">
                 <a:tc>
                   <a:txBody>
                     <a:bodyPr/>
                     <a:lstStyle/>
                     <a:p>
-                      <a:pPr marL="0" marR="0" lvl="0" indent="0" algn="l" rtl="0">
+                      <a:pPr rtl="0" fontAlgn="t">
                         <a:spcBef>
                           <a:spcPts val="0"/>
                         </a:spcBef>
                         <a:spcAft>
                           <a:spcPts val="0"/>
                         </a:spcAft>
-                        <a:buNone/>
                       </a:pPr>
                       <a:r>
-                        <a:rPr lang="en-US" sz="1800"/>
-                        <a:t>10am-noon</a:t>
+                        <a:rPr lang="en-US" sz="1800" b="0" i="0" u="none" strike="noStrike">
+                          <a:solidFill>
+                            <a:srgbClr val="000000"/>
+                          </a:solidFill>
+                          <a:effectLst/>
+                          <a:latin typeface="Calibri" panose="020F0502020204030204" pitchFamily="34" charset="0"/>
+                        </a:rPr>
+                        <a:t>Data Visualization</a:t>
                       </a:r>
-                      <a:endParaRPr/>
+                      <a:endParaRPr lang="en-US" sz="1400">
+                        <a:effectLst/>
+                      </a:endParaRPr>
+                    </a:p>
+                    <a:p>
+                      <a:pPr fontAlgn="t"/>
+                      <a:br>
+                        <a:rPr lang="en-US" sz="1400">
+                          <a:effectLst/>
+                        </a:rPr>
+                      </a:br>
+                      <a:endParaRPr lang="en-US" sz="1400">
+                        <a:effectLst/>
+                      </a:endParaRPr>
                     </a:p>
                   </a:txBody>
-                  <a:tcPr marL="91450" marR="91450" marT="45725" marB="45725"/>
+                  <a:tcPr marL="95164" marR="95164" marT="47582" marB="47582">
+                    <a:lnL w="12697" cap="flat" cmpd="sng" algn="ctr">
+                      <a:solidFill>
+                        <a:srgbClr val="000000"/>
+                      </a:solidFill>
+                      <a:prstDash val="solid"/>
+                      <a:round/>
+                      <a:headEnd type="none" w="med" len="med"/>
+                      <a:tailEnd type="none" w="med" len="med"/>
+                    </a:lnL>
+                    <a:lnR w="12697" cap="flat" cmpd="sng" algn="ctr">
+                      <a:solidFill>
+                        <a:srgbClr val="000000"/>
+                      </a:solidFill>
+                      <a:prstDash val="solid"/>
+                      <a:round/>
+                      <a:headEnd type="none" w="med" len="med"/>
+                      <a:tailEnd type="none" w="med" len="med"/>
+                    </a:lnR>
+                    <a:lnT w="12697" cap="flat" cmpd="sng" algn="ctr">
+                      <a:solidFill>
+                        <a:srgbClr val="000000"/>
+                      </a:solidFill>
+                      <a:prstDash val="solid"/>
+                      <a:round/>
+                      <a:headEnd type="none" w="med" len="med"/>
+                      <a:tailEnd type="none" w="med" len="med"/>
+                    </a:lnT>
+                    <a:lnB w="12697" cap="flat" cmpd="sng" algn="ctr">
+                      <a:solidFill>
+                        <a:srgbClr val="000000"/>
+                      </a:solidFill>
+                      <a:prstDash val="solid"/>
+                      <a:round/>
+                      <a:headEnd type="none" w="med" len="med"/>
+                      <a:tailEnd type="none" w="med" len="med"/>
+                    </a:lnB>
+                    <a:solidFill>
+                      <a:srgbClr val="CACACA"/>
+                    </a:solidFill>
+                  </a:tcPr>
                 </a:tc>
                 <a:tc>
                   <a:txBody>
                     <a:bodyPr/>
                     <a:lstStyle/>
                     <a:p>
-                      <a:pPr marL="0" marR="0" lvl="0" indent="0" algn="l" rtl="0">
+                      <a:pPr rtl="0" fontAlgn="t">
                         <a:spcBef>
                           <a:spcPts val="0"/>
                         </a:spcBef>
                         <a:spcAft>
                           <a:spcPts val="0"/>
                         </a:spcAft>
-                        <a:buNone/>
                       </a:pPr>
                       <a:r>
-                        <a:rPr lang="en-US" sz="1800"/>
-                        <a:t>Asynchronous material</a:t>
+                        <a:rPr lang="en-US" sz="1800" b="0" i="0" u="none" strike="noStrike">
+                          <a:solidFill>
+                            <a:srgbClr val="000000"/>
+                          </a:solidFill>
+                          <a:effectLst/>
+                          <a:latin typeface="Calibri" panose="020F0502020204030204" pitchFamily="34" charset="0"/>
+                        </a:rPr>
+                        <a:t>Roshni and Gaby available via Slack</a:t>
                       </a:r>
-                      <a:endParaRPr/>
+                      <a:endParaRPr lang="en-US" sz="1400">
+                        <a:effectLst/>
+                      </a:endParaRPr>
                     </a:p>
                   </a:txBody>
-                  <a:tcPr marL="91450" marR="91450" marT="45725" marB="45725"/>
+                  <a:tcPr marL="95164" marR="95164" marT="47582" marB="47582">
+                    <a:lnL w="12697" cap="flat" cmpd="sng" algn="ctr">
+                      <a:solidFill>
+                        <a:srgbClr val="000000"/>
+                      </a:solidFill>
+                      <a:prstDash val="solid"/>
+                      <a:round/>
+                      <a:headEnd type="none" w="med" len="med"/>
+                      <a:tailEnd type="none" w="med" len="med"/>
+                    </a:lnL>
+                    <a:lnR w="12697" cap="flat" cmpd="sng" algn="ctr">
+                      <a:solidFill>
+                        <a:srgbClr val="000000"/>
+                      </a:solidFill>
+                      <a:prstDash val="solid"/>
+                      <a:round/>
+                      <a:headEnd type="none" w="med" len="med"/>
+                      <a:tailEnd type="none" w="med" len="med"/>
+                    </a:lnR>
+                    <a:lnT w="12697" cap="flat" cmpd="sng" algn="ctr">
+                      <a:solidFill>
+                        <a:srgbClr val="000000"/>
+                      </a:solidFill>
+                      <a:prstDash val="solid"/>
+                      <a:round/>
+                      <a:headEnd type="none" w="med" len="med"/>
+                      <a:tailEnd type="none" w="med" len="med"/>
+                    </a:lnT>
+                    <a:lnB w="12697" cap="flat" cmpd="sng" algn="ctr">
+                      <a:solidFill>
+                        <a:srgbClr val="000000"/>
+                      </a:solidFill>
+                      <a:prstDash val="solid"/>
+                      <a:round/>
+                      <a:headEnd type="none" w="med" len="med"/>
+                      <a:tailEnd type="none" w="med" len="med"/>
+                    </a:lnB>
+                    <a:solidFill>
+                      <a:srgbClr val="CACACA"/>
+                    </a:solidFill>
+                  </a:tcPr>
                 </a:tc>
                 <a:tc>
                   <a:txBody>
                     <a:bodyPr/>
                     <a:lstStyle/>
                     <a:p>
-                      <a:pPr marL="0" marR="0" lvl="0" indent="0" algn="l" rtl="0">
-                        <a:lnSpc>
-                          <a:spcPct val="100000"/>
-                        </a:lnSpc>
+                      <a:pPr rtl="0" fontAlgn="t">
                         <a:spcBef>
                           <a:spcPts val="0"/>
                         </a:spcBef>
                         <a:spcAft>
                           <a:spcPts val="0"/>
                         </a:spcAft>
-                        <a:buClr>
-                          <a:schemeClr val="dk1"/>
-                        </a:buClr>
-                        <a:buSzPts val="1800"/>
-                        <a:buFont typeface="Calibri"/>
-                        <a:buNone/>
                       </a:pPr>
                       <a:r>
-                        <a:rPr lang="en-US" sz="1800"/>
-                        <a:t>Data Visualization</a:t>
+                        <a:rPr lang="en-US" sz="1800" b="0" i="0" u="none" strike="noStrike">
+                          <a:solidFill>
+                            <a:srgbClr val="000000"/>
+                          </a:solidFill>
+                          <a:effectLst/>
+                          <a:latin typeface="Calibri" panose="020F0502020204030204" pitchFamily="34" charset="0"/>
+                        </a:rPr>
+                        <a:t>Day 2 independent work videos</a:t>
                       </a:r>
-                      <a:endParaRPr/>
+                      <a:endParaRPr lang="en-US" sz="1400">
+                        <a:effectLst/>
+                      </a:endParaRPr>
                     </a:p>
+                  </a:txBody>
+                  <a:tcPr marL="95164" marR="95164" marT="47582" marB="47582">
+                    <a:lnL w="12697" cap="flat" cmpd="sng" algn="ctr">
+                      <a:solidFill>
+                        <a:srgbClr val="000000"/>
+                      </a:solidFill>
+                      <a:prstDash val="solid"/>
+                      <a:round/>
+                      <a:headEnd type="none" w="med" len="med"/>
+                      <a:tailEnd type="none" w="med" len="med"/>
+                    </a:lnL>
+                    <a:lnR w="12697" cap="flat" cmpd="sng" algn="ctr">
+                      <a:solidFill>
+                        <a:srgbClr val="000000"/>
+                      </a:solidFill>
+                      <a:prstDash val="solid"/>
+                      <a:round/>
+                      <a:headEnd type="none" w="med" len="med"/>
+                      <a:tailEnd type="none" w="med" len="med"/>
+                    </a:lnR>
+                    <a:lnT w="12697" cap="flat" cmpd="sng" algn="ctr">
+                      <a:solidFill>
+                        <a:srgbClr val="000000"/>
+                      </a:solidFill>
+                      <a:prstDash val="solid"/>
+                      <a:round/>
+                      <a:headEnd type="none" w="med" len="med"/>
+                      <a:tailEnd type="none" w="med" len="med"/>
+                    </a:lnT>
+                    <a:lnB w="12697" cap="flat" cmpd="sng" algn="ctr">
+                      <a:solidFill>
+                        <a:srgbClr val="000000"/>
+                      </a:solidFill>
+                      <a:prstDash val="solid"/>
+                      <a:round/>
+                      <a:headEnd type="none" w="med" len="med"/>
+                      <a:tailEnd type="none" w="med" len="med"/>
+                    </a:lnB>
+                    <a:solidFill>
+                      <a:srgbClr val="CACACA"/>
+                    </a:solidFill>
+                  </a:tcPr>
+                </a:tc>
+                <a:extLst>
+                  <a:ext uri="{0D108BD9-81ED-4DB2-BD59-A6C34878D82A}">
+                    <a16:rowId xmlns:a16="http://schemas.microsoft.com/office/drawing/2014/main" val="2467307521"/>
+                  </a:ext>
+                </a:extLst>
+              </a:tr>
+              <a:tr h="643307">
+                <a:tc>
+                  <a:txBody>
+                    <a:bodyPr/>
+                    <a:lstStyle/>
                     <a:p>
-                      <a:pPr marL="0" marR="0" lvl="0" indent="0" algn="l" rtl="0">
+                      <a:pPr rtl="0" fontAlgn="t">
                         <a:spcBef>
                           <a:spcPts val="0"/>
                         </a:spcBef>
                         <a:spcAft>
                           <a:spcPts val="0"/>
                         </a:spcAft>
-                        <a:buNone/>
                       </a:pPr>
-                      <a:endParaRPr sz="1800"/>
+                      <a:r>
+                        <a:rPr lang="en-US" sz="1800" b="0" i="0" u="none" strike="noStrike">
+                          <a:solidFill>
+                            <a:srgbClr val="000000"/>
+                          </a:solidFill>
+                          <a:effectLst/>
+                          <a:latin typeface="Calibri" panose="020F0502020204030204" pitchFamily="34" charset="0"/>
+                        </a:rPr>
+                        <a:t>1:30pm - 2:30pm</a:t>
+                      </a:r>
+                      <a:endParaRPr lang="en-US" sz="1400">
+                        <a:effectLst/>
+                      </a:endParaRPr>
                     </a:p>
                   </a:txBody>
-                  <a:tcPr marL="91450" marR="91450" marT="45725" marB="45725"/>
+                  <a:tcPr marL="95164" marR="95164" marT="47582" marB="47582">
+                    <a:lnL w="12697" cap="flat" cmpd="sng" algn="ctr">
+                      <a:solidFill>
+                        <a:srgbClr val="000000"/>
+                      </a:solidFill>
+                      <a:prstDash val="solid"/>
+                      <a:round/>
+                      <a:headEnd type="none" w="med" len="med"/>
+                      <a:tailEnd type="none" w="med" len="med"/>
+                    </a:lnL>
+                    <a:lnR w="12697" cap="flat" cmpd="sng" algn="ctr">
+                      <a:solidFill>
+                        <a:srgbClr val="000000"/>
+                      </a:solidFill>
+                      <a:prstDash val="solid"/>
+                      <a:round/>
+                      <a:headEnd type="none" w="med" len="med"/>
+                      <a:tailEnd type="none" w="med" len="med"/>
+                    </a:lnR>
+                    <a:lnT w="12697" cap="flat" cmpd="sng" algn="ctr">
+                      <a:solidFill>
+                        <a:srgbClr val="000000"/>
+                      </a:solidFill>
+                      <a:prstDash val="solid"/>
+                      <a:round/>
+                      <a:headEnd type="none" w="med" len="med"/>
+                      <a:tailEnd type="none" w="med" len="med"/>
+                    </a:lnT>
+                    <a:lnB w="12697" cap="flat" cmpd="sng" algn="ctr">
+                      <a:solidFill>
+                        <a:srgbClr val="000000"/>
+                      </a:solidFill>
+                      <a:prstDash val="solid"/>
+                      <a:round/>
+                      <a:headEnd type="none" w="med" len="med"/>
+                      <a:tailEnd type="none" w="med" len="med"/>
+                    </a:lnB>
+                    <a:solidFill>
+                      <a:srgbClr val="E6E6E6"/>
+                    </a:solidFill>
+                  </a:tcPr>
                 </a:tc>
                 <a:tc>
                   <a:txBody>
                     <a:bodyPr/>
                     <a:lstStyle/>
                     <a:p>
-                      <a:pPr marL="0" marR="0" lvl="0" indent="0" algn="l" rtl="0">
+                      <a:pPr rtl="0" fontAlgn="t">
                         <a:spcBef>
                           <a:spcPts val="0"/>
                         </a:spcBef>
                         <a:spcAft>
                           <a:spcPts val="0"/>
                         </a:spcAft>
-                        <a:buNone/>
                       </a:pPr>
                       <a:r>
-                        <a:rPr lang="en-US" sz="1800"/>
-                        <a:t>Roshni and Gaby available via Slack</a:t>
+                        <a:rPr lang="en-US" sz="1800" b="0" i="0" u="none" strike="noStrike">
+                          <a:solidFill>
+                            <a:srgbClr val="000000"/>
+                          </a:solidFill>
+                          <a:effectLst/>
+                          <a:latin typeface="Calibri" panose="020F0502020204030204" pitchFamily="34" charset="0"/>
+                        </a:rPr>
+                        <a:t>In-person via zoom</a:t>
                       </a:r>
-                      <a:endParaRPr/>
+                      <a:endParaRPr lang="en-US" sz="1400">
+                        <a:effectLst/>
+                      </a:endParaRPr>
                     </a:p>
                   </a:txBody>
-                  <a:tcPr marL="91450" marR="91450" marT="45725" marB="45725"/>
+                  <a:tcPr marL="95164" marR="95164" marT="47582" marB="47582">
+                    <a:lnL w="12697" cap="flat" cmpd="sng" algn="ctr">
+                      <a:solidFill>
+                        <a:srgbClr val="000000"/>
+                      </a:solidFill>
+                      <a:prstDash val="solid"/>
+                      <a:round/>
+                      <a:headEnd type="none" w="med" len="med"/>
+                      <a:tailEnd type="none" w="med" len="med"/>
+                    </a:lnL>
+                    <a:lnR w="12697" cap="flat" cmpd="sng" algn="ctr">
+                      <a:solidFill>
+                        <a:srgbClr val="000000"/>
+                      </a:solidFill>
+                      <a:prstDash val="solid"/>
+                      <a:round/>
+                      <a:headEnd type="none" w="med" len="med"/>
+                      <a:tailEnd type="none" w="med" len="med"/>
+                    </a:lnR>
+                    <a:lnT w="12697" cap="flat" cmpd="sng" algn="ctr">
+                      <a:solidFill>
+                        <a:srgbClr val="000000"/>
+                      </a:solidFill>
+                      <a:prstDash val="solid"/>
+                      <a:round/>
+                      <a:headEnd type="none" w="med" len="med"/>
+                      <a:tailEnd type="none" w="med" len="med"/>
+                    </a:lnT>
+                    <a:lnB w="12697" cap="flat" cmpd="sng" algn="ctr">
+                      <a:solidFill>
+                        <a:srgbClr val="000000"/>
+                      </a:solidFill>
+                      <a:prstDash val="solid"/>
+                      <a:round/>
+                      <a:headEnd type="none" w="med" len="med"/>
+                      <a:tailEnd type="none" w="med" len="med"/>
+                    </a:lnB>
+                    <a:solidFill>
+                      <a:srgbClr val="E6E6E6"/>
+                    </a:solidFill>
+                  </a:tcPr>
                 </a:tc>
                 <a:tc>
                   <a:txBody>
                     <a:bodyPr/>
                     <a:lstStyle/>
                     <a:p>
-                      <a:pPr marL="0" marR="0" lvl="0" indent="0" algn="l" rtl="0">
+                      <a:pPr rtl="0" fontAlgn="t">
                         <a:spcBef>
                           <a:spcPts val="0"/>
                         </a:spcBef>
                         <a:spcAft>
                           <a:spcPts val="0"/>
                         </a:spcAft>
-                        <a:buNone/>
                       </a:pPr>
                       <a:r>
-                        <a:rPr lang="en-US" sz="1800"/>
-                        <a:t>Day 2 independent work videos</a:t>
+                        <a:rPr lang="en-US" sz="1800" b="0" i="0" u="none" strike="noStrike">
+                          <a:solidFill>
+                            <a:srgbClr val="000000"/>
+                          </a:solidFill>
+                          <a:effectLst/>
+                          <a:latin typeface="Calibri" panose="020F0502020204030204" pitchFamily="34" charset="0"/>
+                        </a:rPr>
+                        <a:t>Statistical Analysis pipeline</a:t>
                       </a:r>
-                      <a:endParaRPr sz="1800"/>
+                      <a:endParaRPr lang="en-US" sz="1400">
+                        <a:effectLst/>
+                      </a:endParaRPr>
                     </a:p>
                   </a:txBody>
-                  <a:tcPr marL="91450" marR="91450" marT="45725" marB="45725"/>
+                  <a:tcPr marL="95164" marR="95164" marT="47582" marB="47582">
+                    <a:lnL w="12697" cap="flat" cmpd="sng" algn="ctr">
+                      <a:solidFill>
+                        <a:srgbClr val="000000"/>
+                      </a:solidFill>
+                      <a:prstDash val="solid"/>
+                      <a:round/>
+                      <a:headEnd type="none" w="med" len="med"/>
+                      <a:tailEnd type="none" w="med" len="med"/>
+                    </a:lnL>
+                    <a:lnR w="12697" cap="flat" cmpd="sng" algn="ctr">
+                      <a:solidFill>
+                        <a:srgbClr val="000000"/>
+                      </a:solidFill>
+                      <a:prstDash val="solid"/>
+                      <a:round/>
+                      <a:headEnd type="none" w="med" len="med"/>
+                      <a:tailEnd type="none" w="med" len="med"/>
+                    </a:lnR>
+                    <a:lnT w="12697" cap="flat" cmpd="sng" algn="ctr">
+                      <a:solidFill>
+                        <a:srgbClr val="000000"/>
+                      </a:solidFill>
+                      <a:prstDash val="solid"/>
+                      <a:round/>
+                      <a:headEnd type="none" w="med" len="med"/>
+                      <a:tailEnd type="none" w="med" len="med"/>
+                    </a:lnT>
+                    <a:lnB w="12697" cap="flat" cmpd="sng" algn="ctr">
+                      <a:solidFill>
+                        <a:srgbClr val="000000"/>
+                      </a:solidFill>
+                      <a:prstDash val="solid"/>
+                      <a:round/>
+                      <a:headEnd type="none" w="med" len="med"/>
+                      <a:tailEnd type="none" w="med" len="med"/>
+                    </a:lnB>
+                    <a:solidFill>
+                      <a:srgbClr val="E6E6E6"/>
+                    </a:solidFill>
+                  </a:tcPr>
                 </a:tc>
-                <a:extLst>
-                  <a:ext uri="{0D108BD9-81ED-4DB2-BD59-A6C34878D82A}">
-                    <a16:rowId xmlns:a16="http://schemas.microsoft.com/office/drawing/2014/main" val="10002"/>
-                  </a:ext>
-                </a:extLst>
-              </a:tr>
-              <a:tr h="370850">
                 <a:tc>
                   <a:txBody>
                     <a:bodyPr/>
                     <a:lstStyle/>
                     <a:p>
-                      <a:pPr marL="0" marR="0" lvl="0" indent="0" algn="l" rtl="0">
+                      <a:pPr rtl="0" fontAlgn="t">
                         <a:spcBef>
                           <a:spcPts val="0"/>
                         </a:spcBef>
                         <a:spcAft>
                           <a:spcPts val="0"/>
                         </a:spcAft>
-                        <a:buNone/>
                       </a:pPr>
                       <a:r>
-                        <a:rPr lang="en-US" sz="1800"/>
-                        <a:t>1pm ~2:30pm </a:t>
+                        <a:rPr lang="en-US" sz="1800" b="0" i="0" u="none" strike="noStrike">
+                          <a:solidFill>
+                            <a:srgbClr val="000000"/>
+                          </a:solidFill>
+                          <a:effectLst/>
+                          <a:latin typeface="Calibri" panose="020F0502020204030204" pitchFamily="34" charset="0"/>
+                        </a:rPr>
+                        <a:t>Roshni</a:t>
                       </a:r>
-                      <a:endParaRPr/>
+                      <a:endParaRPr lang="en-US" sz="1400">
+                        <a:effectLst/>
+                      </a:endParaRPr>
                     </a:p>
                   </a:txBody>
-                  <a:tcPr marL="91450" marR="91450" marT="45725" marB="45725"/>
+                  <a:tcPr marL="95164" marR="95164" marT="47582" marB="47582">
+                    <a:lnL w="12697" cap="flat" cmpd="sng" algn="ctr">
+                      <a:solidFill>
+                        <a:srgbClr val="000000"/>
+                      </a:solidFill>
+                      <a:prstDash val="solid"/>
+                      <a:round/>
+                      <a:headEnd type="none" w="med" len="med"/>
+                      <a:tailEnd type="none" w="med" len="med"/>
+                    </a:lnL>
+                    <a:lnR w="12697" cap="flat" cmpd="sng" algn="ctr">
+                      <a:solidFill>
+                        <a:srgbClr val="000000"/>
+                      </a:solidFill>
+                      <a:prstDash val="solid"/>
+                      <a:round/>
+                      <a:headEnd type="none" w="med" len="med"/>
+                      <a:tailEnd type="none" w="med" len="med"/>
+                    </a:lnR>
+                    <a:lnT w="12697" cap="flat" cmpd="sng" algn="ctr">
+                      <a:solidFill>
+                        <a:srgbClr val="000000"/>
+                      </a:solidFill>
+                      <a:prstDash val="solid"/>
+                      <a:round/>
+                      <a:headEnd type="none" w="med" len="med"/>
+                      <a:tailEnd type="none" w="med" len="med"/>
+                    </a:lnT>
+                    <a:lnB w="12697" cap="flat" cmpd="sng" algn="ctr">
+                      <a:solidFill>
+                        <a:srgbClr val="000000"/>
+                      </a:solidFill>
+                      <a:prstDash val="solid"/>
+                      <a:round/>
+                      <a:headEnd type="none" w="med" len="med"/>
+                      <a:tailEnd type="none" w="med" len="med"/>
+                    </a:lnB>
+                    <a:solidFill>
+                      <a:srgbClr val="E6E6E6"/>
+                    </a:solidFill>
+                  </a:tcPr>
                 </a:tc>
                 <a:tc>
                   <a:txBody>
                     <a:bodyPr/>
                     <a:lstStyle/>
                     <a:p>
-                      <a:pPr marL="0" marR="0" lvl="0" indent="0" algn="l" rtl="0">
+                      <a:pPr rtl="0" fontAlgn="t">
                         <a:spcBef>
                           <a:spcPts val="0"/>
                         </a:spcBef>
                         <a:spcAft>
                           <a:spcPts val="0"/>
                         </a:spcAft>
-                        <a:buNone/>
                       </a:pPr>
                       <a:r>
-                        <a:rPr lang="en-US" sz="1800"/>
-                        <a:t>In-person via zoom</a:t>
+                        <a:rPr lang="en-US" sz="1800" b="0" i="0" u="none" strike="noStrike">
+                          <a:solidFill>
+                            <a:srgbClr val="000000"/>
+                          </a:solidFill>
+                          <a:effectLst/>
+                          <a:latin typeface="Calibri" panose="020F0502020204030204" pitchFamily="34" charset="0"/>
+                        </a:rPr>
+                        <a:t>04_stat_intro</a:t>
                       </a:r>
-                      <a:endParaRPr/>
+                      <a:endParaRPr lang="en-US" sz="1400">
+                        <a:effectLst/>
+                      </a:endParaRPr>
                     </a:p>
                   </a:txBody>
-                  <a:tcPr marL="91450" marR="91450" marT="45725" marB="45725"/>
+                  <a:tcPr marL="95164" marR="95164" marT="47582" marB="47582">
+                    <a:lnL w="12697" cap="flat" cmpd="sng" algn="ctr">
+                      <a:solidFill>
+                        <a:srgbClr val="000000"/>
+                      </a:solidFill>
+                      <a:prstDash val="solid"/>
+                      <a:round/>
+                      <a:headEnd type="none" w="med" len="med"/>
+                      <a:tailEnd type="none" w="med" len="med"/>
+                    </a:lnL>
+                    <a:lnR w="12697" cap="flat" cmpd="sng" algn="ctr">
+                      <a:solidFill>
+                        <a:srgbClr val="000000"/>
+                      </a:solidFill>
+                      <a:prstDash val="solid"/>
+                      <a:round/>
+                      <a:headEnd type="none" w="med" len="med"/>
+                      <a:tailEnd type="none" w="med" len="med"/>
+                    </a:lnR>
+                    <a:lnT w="12697" cap="flat" cmpd="sng" algn="ctr">
+                      <a:solidFill>
+                        <a:srgbClr val="000000"/>
+                      </a:solidFill>
+                      <a:prstDash val="solid"/>
+                      <a:round/>
+                      <a:headEnd type="none" w="med" len="med"/>
+                      <a:tailEnd type="none" w="med" len="med"/>
+                    </a:lnT>
+                    <a:lnB w="12697" cap="flat" cmpd="sng" algn="ctr">
+                      <a:solidFill>
+                        <a:srgbClr val="000000"/>
+                      </a:solidFill>
+                      <a:prstDash val="solid"/>
+                      <a:round/>
+                      <a:headEnd type="none" w="med" len="med"/>
+                      <a:tailEnd type="none" w="med" len="med"/>
+                    </a:lnB>
+                    <a:solidFill>
+                      <a:srgbClr val="E6E6E6"/>
+                    </a:solidFill>
+                  </a:tcPr>
+                </a:tc>
+                <a:extLst>
+                  <a:ext uri="{0D108BD9-81ED-4DB2-BD59-A6C34878D82A}">
+                    <a16:rowId xmlns:a16="http://schemas.microsoft.com/office/drawing/2014/main" val="2233768180"/>
+                  </a:ext>
+                </a:extLst>
+              </a:tr>
+              <a:tr h="643307">
+                <a:tc>
+                  <a:txBody>
+                    <a:bodyPr/>
+                    <a:lstStyle/>
+                    <a:p>
+                      <a:pPr rtl="0" fontAlgn="t">
+                        <a:spcBef>
+                          <a:spcPts val="0"/>
+                        </a:spcBef>
+                        <a:spcAft>
+                          <a:spcPts val="0"/>
+                        </a:spcAft>
+                      </a:pPr>
+                      <a:r>
+                        <a:rPr lang="en-US" sz="1800" b="0" i="0" u="none" strike="noStrike">
+                          <a:solidFill>
+                            <a:srgbClr val="000000"/>
+                          </a:solidFill>
+                          <a:effectLst/>
+                          <a:latin typeface="Calibri" panose="020F0502020204030204" pitchFamily="34" charset="0"/>
+                        </a:rPr>
+                        <a:t>2:30pm-4:00pm</a:t>
+                      </a:r>
+                      <a:endParaRPr lang="en-US" sz="1400">
+                        <a:effectLst/>
+                      </a:endParaRPr>
+                    </a:p>
+                  </a:txBody>
+                  <a:tcPr marL="95164" marR="95164" marT="47582" marB="47582">
+                    <a:lnL w="12697" cap="flat" cmpd="sng" algn="ctr">
+                      <a:solidFill>
+                        <a:srgbClr val="000000"/>
+                      </a:solidFill>
+                      <a:prstDash val="solid"/>
+                      <a:round/>
+                      <a:headEnd type="none" w="med" len="med"/>
+                      <a:tailEnd type="none" w="med" len="med"/>
+                    </a:lnL>
+                    <a:lnR w="12697" cap="flat" cmpd="sng" algn="ctr">
+                      <a:solidFill>
+                        <a:srgbClr val="000000"/>
+                      </a:solidFill>
+                      <a:prstDash val="solid"/>
+                      <a:round/>
+                      <a:headEnd type="none" w="med" len="med"/>
+                      <a:tailEnd type="none" w="med" len="med"/>
+                    </a:lnR>
+                    <a:lnT w="12697" cap="flat" cmpd="sng" algn="ctr">
+                      <a:solidFill>
+                        <a:srgbClr val="000000"/>
+                      </a:solidFill>
+                      <a:prstDash val="solid"/>
+                      <a:round/>
+                      <a:headEnd type="none" w="med" len="med"/>
+                      <a:tailEnd type="none" w="med" len="med"/>
+                    </a:lnT>
+                    <a:lnB w="12697" cap="flat" cmpd="sng" algn="ctr">
+                      <a:solidFill>
+                        <a:srgbClr val="000000"/>
+                      </a:solidFill>
+                      <a:prstDash val="solid"/>
+                      <a:round/>
+                      <a:headEnd type="none" w="med" len="med"/>
+                      <a:tailEnd type="none" w="med" len="med"/>
+                    </a:lnB>
+                    <a:solidFill>
+                      <a:srgbClr val="CACACA"/>
+                    </a:solidFill>
+                  </a:tcPr>
                 </a:tc>
                 <a:tc>
                   <a:txBody>
                     <a:bodyPr/>
                     <a:lstStyle/>
                     <a:p>
-                      <a:pPr marL="0" marR="0" lvl="0" indent="0" algn="l" rtl="0">
+                      <a:pPr rtl="0" fontAlgn="t">
                         <a:spcBef>
                           <a:spcPts val="0"/>
                         </a:spcBef>
                         <a:spcAft>
                           <a:spcPts val="0"/>
                         </a:spcAft>
-                        <a:buNone/>
                       </a:pPr>
                       <a:r>
-                        <a:rPr lang="en-US" sz="1800"/>
-                        <a:t>Statistical Analysis using Python</a:t>
+                        <a:rPr lang="en-US" sz="1800" b="0" i="0" u="none" strike="noStrike">
+                          <a:solidFill>
+                            <a:srgbClr val="000000"/>
+                          </a:solidFill>
+                          <a:effectLst/>
+                          <a:latin typeface="Calibri" panose="020F0502020204030204" pitchFamily="34" charset="0"/>
+                        </a:rPr>
+                        <a:t>Asynchronous material</a:t>
                       </a:r>
-                      <a:endParaRPr/>
+                      <a:endParaRPr lang="en-US" sz="1400">
+                        <a:effectLst/>
+                      </a:endParaRPr>
                     </a:p>
                   </a:txBody>
-                  <a:tcPr marL="91450" marR="91450" marT="45725" marB="45725"/>
+                  <a:tcPr marL="95164" marR="95164" marT="47582" marB="47582">
+                    <a:lnL w="12697" cap="flat" cmpd="sng" algn="ctr">
+                      <a:solidFill>
+                        <a:srgbClr val="000000"/>
+                      </a:solidFill>
+                      <a:prstDash val="solid"/>
+                      <a:round/>
+                      <a:headEnd type="none" w="med" len="med"/>
+                      <a:tailEnd type="none" w="med" len="med"/>
+                    </a:lnL>
+                    <a:lnR w="12697" cap="flat" cmpd="sng" algn="ctr">
+                      <a:solidFill>
+                        <a:srgbClr val="000000"/>
+                      </a:solidFill>
+                      <a:prstDash val="solid"/>
+                      <a:round/>
+                      <a:headEnd type="none" w="med" len="med"/>
+                      <a:tailEnd type="none" w="med" len="med"/>
+                    </a:lnR>
+                    <a:lnT w="12697" cap="flat" cmpd="sng" algn="ctr">
+                      <a:solidFill>
+                        <a:srgbClr val="000000"/>
+                      </a:solidFill>
+                      <a:prstDash val="solid"/>
+                      <a:round/>
+                      <a:headEnd type="none" w="med" len="med"/>
+                      <a:tailEnd type="none" w="med" len="med"/>
+                    </a:lnT>
+                    <a:lnB w="12697" cap="flat" cmpd="sng" algn="ctr">
+                      <a:solidFill>
+                        <a:srgbClr val="000000"/>
+                      </a:solidFill>
+                      <a:prstDash val="solid"/>
+                      <a:round/>
+                      <a:headEnd type="none" w="med" len="med"/>
+                      <a:tailEnd type="none" w="med" len="med"/>
+                    </a:lnB>
+                    <a:solidFill>
+                      <a:srgbClr val="CACACA"/>
+                    </a:solidFill>
+                  </a:tcPr>
                 </a:tc>
                 <a:tc>
                   <a:txBody>
                     <a:bodyPr/>
                     <a:lstStyle/>
                     <a:p>
-                      <a:pPr marL="0" marR="0" lvl="0" indent="0" algn="l" rtl="0">
+                      <a:pPr rtl="0" fontAlgn="t">
                         <a:spcBef>
                           <a:spcPts val="0"/>
                         </a:spcBef>
                         <a:spcAft>
                           <a:spcPts val="0"/>
                         </a:spcAft>
-                        <a:buNone/>
                       </a:pPr>
                       <a:r>
-                        <a:rPr lang="en-US" sz="1800"/>
-                        <a:t>Roshni</a:t>
+                        <a:rPr lang="en-US" sz="1800" b="0" i="0" u="none" strike="noStrike">
+                          <a:solidFill>
+                            <a:srgbClr val="000000"/>
+                          </a:solidFill>
+                          <a:effectLst/>
+                          <a:latin typeface="Calibri" panose="020F0502020204030204" pitchFamily="34" charset="0"/>
+                        </a:rPr>
+                        <a:t>Statistical Analysis using Python</a:t>
                       </a:r>
-                      <a:endParaRPr/>
+                      <a:endParaRPr lang="en-US" sz="1400">
+                        <a:effectLst/>
+                      </a:endParaRPr>
                     </a:p>
                   </a:txBody>
-                  <a:tcPr marL="91450" marR="91450" marT="45725" marB="45725"/>
+                  <a:tcPr marL="95164" marR="95164" marT="47582" marB="47582">
+                    <a:lnL w="12697" cap="flat" cmpd="sng" algn="ctr">
+                      <a:solidFill>
+                        <a:srgbClr val="000000"/>
+                      </a:solidFill>
+                      <a:prstDash val="solid"/>
+                      <a:round/>
+                      <a:headEnd type="none" w="med" len="med"/>
+                      <a:tailEnd type="none" w="med" len="med"/>
+                    </a:lnL>
+                    <a:lnR w="12697" cap="flat" cmpd="sng" algn="ctr">
+                      <a:solidFill>
+                        <a:srgbClr val="000000"/>
+                      </a:solidFill>
+                      <a:prstDash val="solid"/>
+                      <a:round/>
+                      <a:headEnd type="none" w="med" len="med"/>
+                      <a:tailEnd type="none" w="med" len="med"/>
+                    </a:lnR>
+                    <a:lnT w="12697" cap="flat" cmpd="sng" algn="ctr">
+                      <a:solidFill>
+                        <a:srgbClr val="000000"/>
+                      </a:solidFill>
+                      <a:prstDash val="solid"/>
+                      <a:round/>
+                      <a:headEnd type="none" w="med" len="med"/>
+                      <a:tailEnd type="none" w="med" len="med"/>
+                    </a:lnT>
+                    <a:lnB w="12697" cap="flat" cmpd="sng" algn="ctr">
+                      <a:solidFill>
+                        <a:srgbClr val="000000"/>
+                      </a:solidFill>
+                      <a:prstDash val="solid"/>
+                      <a:round/>
+                      <a:headEnd type="none" w="med" len="med"/>
+                      <a:tailEnd type="none" w="med" len="med"/>
+                    </a:lnB>
+                    <a:solidFill>
+                      <a:srgbClr val="CACACA"/>
+                    </a:solidFill>
+                  </a:tcPr>
                 </a:tc>
                 <a:tc>
                   <a:txBody>
                     <a:bodyPr/>
                     <a:lstStyle/>
                     <a:p>
-                      <a:pPr marL="0" marR="0" lvl="0" indent="0" algn="l" rtl="0">
+                      <a:pPr rtl="0" fontAlgn="t">
                         <a:spcBef>
                           <a:spcPts val="0"/>
                         </a:spcBef>
                         <a:spcAft>
                           <a:spcPts val="0"/>
                         </a:spcAft>
-                        <a:buNone/>
                       </a:pPr>
                       <a:r>
-                        <a:rPr lang="en-US" sz="1800"/>
-                        <a:t>04_python_stat</a:t>
+                        <a:rPr lang="en-US" sz="1800" b="0" i="0" u="none" strike="noStrike">
+                          <a:solidFill>
+                            <a:srgbClr val="000000"/>
+                          </a:solidFill>
+                          <a:effectLst/>
+                          <a:latin typeface="Calibri" panose="020F0502020204030204" pitchFamily="34" charset="0"/>
+                        </a:rPr>
+                        <a:t>Roshni and Gaby available via Slack</a:t>
                       </a:r>
-                      <a:endParaRPr sz="1800"/>
+                      <a:endParaRPr lang="en-US" sz="1400">
+                        <a:effectLst/>
+                      </a:endParaRPr>
                     </a:p>
                   </a:txBody>
-                  <a:tcPr marL="91450" marR="91450" marT="45725" marB="45725"/>
+                  <a:tcPr marL="95164" marR="95164" marT="47582" marB="47582">
+                    <a:lnL w="12697" cap="flat" cmpd="sng" algn="ctr">
+                      <a:solidFill>
+                        <a:srgbClr val="000000"/>
+                      </a:solidFill>
+                      <a:prstDash val="solid"/>
+                      <a:round/>
+                      <a:headEnd type="none" w="med" len="med"/>
+                      <a:tailEnd type="none" w="med" len="med"/>
+                    </a:lnL>
+                    <a:lnR w="12697" cap="flat" cmpd="sng" algn="ctr">
+                      <a:solidFill>
+                        <a:srgbClr val="000000"/>
+                      </a:solidFill>
+                      <a:prstDash val="solid"/>
+                      <a:round/>
+                      <a:headEnd type="none" w="med" len="med"/>
+                      <a:tailEnd type="none" w="med" len="med"/>
+                    </a:lnR>
+                    <a:lnT w="12697" cap="flat" cmpd="sng" algn="ctr">
+                      <a:solidFill>
+                        <a:srgbClr val="000000"/>
+                      </a:solidFill>
+                      <a:prstDash val="solid"/>
+                      <a:round/>
+                      <a:headEnd type="none" w="med" len="med"/>
+                      <a:tailEnd type="none" w="med" len="med"/>
+                    </a:lnT>
+                    <a:lnB w="12697" cap="flat" cmpd="sng" algn="ctr">
+                      <a:solidFill>
+                        <a:srgbClr val="000000"/>
+                      </a:solidFill>
+                      <a:prstDash val="solid"/>
+                      <a:round/>
+                      <a:headEnd type="none" w="med" len="med"/>
+                      <a:tailEnd type="none" w="med" len="med"/>
+                    </a:lnB>
+                    <a:solidFill>
+                      <a:srgbClr val="CACACA"/>
+                    </a:solidFill>
+                  </a:tcPr>
                 </a:tc>
-                <a:extLst>
-                  <a:ext uri="{0D108BD9-81ED-4DB2-BD59-A6C34878D82A}">
-                    <a16:rowId xmlns:a16="http://schemas.microsoft.com/office/drawing/2014/main" val="10003"/>
-                  </a:ext>
-                </a:extLst>
-              </a:tr>
-              <a:tr h="370850">
                 <a:tc>
                   <a:txBody>
                     <a:bodyPr/>
                     <a:lstStyle/>
                     <a:p>
-                      <a:pPr marL="0" marR="0" lvl="0" indent="0" algn="l" rtl="0">
+                      <a:pPr rtl="0" fontAlgn="t">
                         <a:spcBef>
                           <a:spcPts val="0"/>
                         </a:spcBef>
                         <a:spcAft>
                           <a:spcPts val="0"/>
                         </a:spcAft>
-                        <a:buNone/>
                       </a:pPr>
                       <a:r>
-                        <a:rPr lang="en-US" sz="1800"/>
-                        <a:t>~2:30-4:30pm</a:t>
+                        <a:rPr lang="en-US" sz="1800" b="0" i="0" u="none" strike="noStrike">
+                          <a:solidFill>
+                            <a:srgbClr val="000000"/>
+                          </a:solidFill>
+                          <a:effectLst/>
+                          <a:latin typeface="Calibri" panose="020F0502020204030204" pitchFamily="34" charset="0"/>
+                        </a:rPr>
+                        <a:t>stats_python_practice</a:t>
                       </a:r>
-                      <a:endParaRPr/>
+                      <a:endParaRPr lang="en-US" sz="1400">
+                        <a:effectLst/>
+                      </a:endParaRPr>
                     </a:p>
                   </a:txBody>
-                  <a:tcPr marL="91450" marR="91450" marT="45725" marB="45725"/>
+                  <a:tcPr marL="95164" marR="95164" marT="47582" marB="47582">
+                    <a:lnL w="12697" cap="flat" cmpd="sng" algn="ctr">
+                      <a:solidFill>
+                        <a:srgbClr val="000000"/>
+                      </a:solidFill>
+                      <a:prstDash val="solid"/>
+                      <a:round/>
+                      <a:headEnd type="none" w="med" len="med"/>
+                      <a:tailEnd type="none" w="med" len="med"/>
+                    </a:lnL>
+                    <a:lnR w="12697" cap="flat" cmpd="sng" algn="ctr">
+                      <a:solidFill>
+                        <a:srgbClr val="000000"/>
+                      </a:solidFill>
+                      <a:prstDash val="solid"/>
+                      <a:round/>
+                      <a:headEnd type="none" w="med" len="med"/>
+                      <a:tailEnd type="none" w="med" len="med"/>
+                    </a:lnR>
+                    <a:lnT w="12697" cap="flat" cmpd="sng" algn="ctr">
+                      <a:solidFill>
+                        <a:srgbClr val="000000"/>
+                      </a:solidFill>
+                      <a:prstDash val="solid"/>
+                      <a:round/>
+                      <a:headEnd type="none" w="med" len="med"/>
+                      <a:tailEnd type="none" w="med" len="med"/>
+                    </a:lnT>
+                    <a:lnB w="12697" cap="flat" cmpd="sng" algn="ctr">
+                      <a:solidFill>
+                        <a:srgbClr val="000000"/>
+                      </a:solidFill>
+                      <a:prstDash val="solid"/>
+                      <a:round/>
+                      <a:headEnd type="none" w="med" len="med"/>
+                      <a:tailEnd type="none" w="med" len="med"/>
+                    </a:lnB>
+                    <a:solidFill>
+                      <a:srgbClr val="CACACA"/>
+                    </a:solidFill>
+                  </a:tcPr>
+                </a:tc>
+                <a:extLst>
+                  <a:ext uri="{0D108BD9-81ED-4DB2-BD59-A6C34878D82A}">
+                    <a16:rowId xmlns:a16="http://schemas.microsoft.com/office/drawing/2014/main" val="3072020810"/>
+                  </a:ext>
+                </a:extLst>
+              </a:tr>
+              <a:tr h="371139">
+                <a:tc>
+                  <a:txBody>
+                    <a:bodyPr/>
+                    <a:lstStyle/>
+                    <a:p>
+                      <a:pPr rtl="0" fontAlgn="t">
+                        <a:spcBef>
+                          <a:spcPts val="0"/>
+                        </a:spcBef>
+                        <a:spcAft>
+                          <a:spcPts val="0"/>
+                        </a:spcAft>
+                      </a:pPr>
+                      <a:r>
+                        <a:rPr lang="en-US" sz="1800" b="0" i="0" u="none" strike="noStrike">
+                          <a:solidFill>
+                            <a:srgbClr val="000000"/>
+                          </a:solidFill>
+                          <a:effectLst/>
+                          <a:latin typeface="Calibri" panose="020F0502020204030204" pitchFamily="34" charset="0"/>
+                        </a:rPr>
+                        <a:t>4:00pm-4:30pm</a:t>
+                      </a:r>
+                      <a:endParaRPr lang="en-US" sz="1400">
+                        <a:effectLst/>
+                      </a:endParaRPr>
+                    </a:p>
+                  </a:txBody>
+                  <a:tcPr marL="95164" marR="95164" marT="47582" marB="47582">
+                    <a:lnL w="12697" cap="flat" cmpd="sng" algn="ctr">
+                      <a:solidFill>
+                        <a:srgbClr val="000000"/>
+                      </a:solidFill>
+                      <a:prstDash val="solid"/>
+                      <a:round/>
+                      <a:headEnd type="none" w="med" len="med"/>
+                      <a:tailEnd type="none" w="med" len="med"/>
+                    </a:lnL>
+                    <a:lnR w="12697" cap="flat" cmpd="sng" algn="ctr">
+                      <a:solidFill>
+                        <a:srgbClr val="000000"/>
+                      </a:solidFill>
+                      <a:prstDash val="solid"/>
+                      <a:round/>
+                      <a:headEnd type="none" w="med" len="med"/>
+                      <a:tailEnd type="none" w="med" len="med"/>
+                    </a:lnR>
+                    <a:lnT w="12697" cap="flat" cmpd="sng" algn="ctr">
+                      <a:solidFill>
+                        <a:srgbClr val="000000"/>
+                      </a:solidFill>
+                      <a:prstDash val="solid"/>
+                      <a:round/>
+                      <a:headEnd type="none" w="med" len="med"/>
+                      <a:tailEnd type="none" w="med" len="med"/>
+                    </a:lnT>
+                    <a:lnB w="12697" cap="flat" cmpd="sng" algn="ctr">
+                      <a:solidFill>
+                        <a:srgbClr val="000000"/>
+                      </a:solidFill>
+                      <a:prstDash val="solid"/>
+                      <a:round/>
+                      <a:headEnd type="none" w="med" len="med"/>
+                      <a:tailEnd type="none" w="med" len="med"/>
+                    </a:lnB>
+                    <a:solidFill>
+                      <a:srgbClr val="E6E6E6"/>
+                    </a:solidFill>
+                  </a:tcPr>
                 </a:tc>
                 <a:tc>
                   <a:txBody>
                     <a:bodyPr/>
                     <a:lstStyle/>
                     <a:p>
-                      <a:pPr marL="0" marR="0" lvl="0" indent="0" algn="l" rtl="0">
+                      <a:pPr rtl="0" fontAlgn="t">
                         <a:spcBef>
                           <a:spcPts val="0"/>
                         </a:spcBef>
                         <a:spcAft>
                           <a:spcPts val="0"/>
                         </a:spcAft>
-                        <a:buNone/>
                       </a:pPr>
                       <a:r>
-                        <a:rPr lang="en-US" sz="1800"/>
-                        <a:t>Asynchronous material</a:t>
+                        <a:rPr lang="en-US" sz="1800" b="0" i="0" u="none" strike="noStrike">
+                          <a:solidFill>
+                            <a:srgbClr val="000000"/>
+                          </a:solidFill>
+                          <a:effectLst/>
+                          <a:latin typeface="Calibri" panose="020F0502020204030204" pitchFamily="34" charset="0"/>
+                        </a:rPr>
+                        <a:t>In-person via zoom</a:t>
                       </a:r>
-                      <a:endParaRPr/>
+                      <a:endParaRPr lang="en-US" sz="1400">
+                        <a:effectLst/>
+                      </a:endParaRPr>
                     </a:p>
                   </a:txBody>
-                  <a:tcPr marL="91450" marR="91450" marT="45725" marB="45725"/>
+                  <a:tcPr marL="95164" marR="95164" marT="47582" marB="47582">
+                    <a:lnL w="12697" cap="flat" cmpd="sng" algn="ctr">
+                      <a:solidFill>
+                        <a:srgbClr val="000000"/>
+                      </a:solidFill>
+                      <a:prstDash val="solid"/>
+                      <a:round/>
+                      <a:headEnd type="none" w="med" len="med"/>
+                      <a:tailEnd type="none" w="med" len="med"/>
+                    </a:lnL>
+                    <a:lnR w="12697" cap="flat" cmpd="sng" algn="ctr">
+                      <a:solidFill>
+                        <a:srgbClr val="000000"/>
+                      </a:solidFill>
+                      <a:prstDash val="solid"/>
+                      <a:round/>
+                      <a:headEnd type="none" w="med" len="med"/>
+                      <a:tailEnd type="none" w="med" len="med"/>
+                    </a:lnR>
+                    <a:lnT w="12697" cap="flat" cmpd="sng" algn="ctr">
+                      <a:solidFill>
+                        <a:srgbClr val="000000"/>
+                      </a:solidFill>
+                      <a:prstDash val="solid"/>
+                      <a:round/>
+                      <a:headEnd type="none" w="med" len="med"/>
+                      <a:tailEnd type="none" w="med" len="med"/>
+                    </a:lnT>
+                    <a:lnB w="12697" cap="flat" cmpd="sng" algn="ctr">
+                      <a:solidFill>
+                        <a:srgbClr val="000000"/>
+                      </a:solidFill>
+                      <a:prstDash val="solid"/>
+                      <a:round/>
+                      <a:headEnd type="none" w="med" len="med"/>
+                      <a:tailEnd type="none" w="med" len="med"/>
+                    </a:lnB>
+                    <a:solidFill>
+                      <a:srgbClr val="E6E6E6"/>
+                    </a:solidFill>
+                  </a:tcPr>
                 </a:tc>
                 <a:tc>
                   <a:txBody>
                     <a:bodyPr/>
                     <a:lstStyle/>
                     <a:p>
-                      <a:pPr marL="0" marR="0" lvl="0" indent="0" algn="l" rtl="0">
+                      <a:pPr rtl="0" fontAlgn="t">
                         <a:spcBef>
                           <a:spcPts val="0"/>
                         </a:spcBef>
                         <a:spcAft>
                           <a:spcPts val="0"/>
                         </a:spcAft>
-                        <a:buNone/>
                       </a:pPr>
                       <a:r>
-                        <a:rPr lang="en-US" sz="1800"/>
-                        <a:t>Statistical Analysis using Python</a:t>
+                        <a:rPr lang="en-US" sz="1800" b="0" i="0" u="none" strike="noStrike">
+                          <a:solidFill>
+                            <a:srgbClr val="000000"/>
+                          </a:solidFill>
+                          <a:effectLst/>
+                          <a:latin typeface="Calibri" panose="020F0502020204030204" pitchFamily="34" charset="0"/>
+                        </a:rPr>
+                        <a:t>Q&amp;A</a:t>
                       </a:r>
-                      <a:endParaRPr/>
+                      <a:endParaRPr lang="en-US" sz="1400">
+                        <a:effectLst/>
+                      </a:endParaRPr>
                     </a:p>
                   </a:txBody>
-                  <a:tcPr marL="91450" marR="91450" marT="45725" marB="45725"/>
+                  <a:tcPr marL="95164" marR="95164" marT="47582" marB="47582">
+                    <a:lnL w="12697" cap="flat" cmpd="sng" algn="ctr">
+                      <a:solidFill>
+                        <a:srgbClr val="000000"/>
+                      </a:solidFill>
+                      <a:prstDash val="solid"/>
+                      <a:round/>
+                      <a:headEnd type="none" w="med" len="med"/>
+                      <a:tailEnd type="none" w="med" len="med"/>
+                    </a:lnL>
+                    <a:lnR w="12697" cap="flat" cmpd="sng" algn="ctr">
+                      <a:solidFill>
+                        <a:srgbClr val="000000"/>
+                      </a:solidFill>
+                      <a:prstDash val="solid"/>
+                      <a:round/>
+                      <a:headEnd type="none" w="med" len="med"/>
+                      <a:tailEnd type="none" w="med" len="med"/>
+                    </a:lnR>
+                    <a:lnT w="12697" cap="flat" cmpd="sng" algn="ctr">
+                      <a:solidFill>
+                        <a:srgbClr val="000000"/>
+                      </a:solidFill>
+                      <a:prstDash val="solid"/>
+                      <a:round/>
+                      <a:headEnd type="none" w="med" len="med"/>
+                      <a:tailEnd type="none" w="med" len="med"/>
+                    </a:lnT>
+                    <a:lnB w="12697" cap="flat" cmpd="sng" algn="ctr">
+                      <a:solidFill>
+                        <a:srgbClr val="000000"/>
+                      </a:solidFill>
+                      <a:prstDash val="solid"/>
+                      <a:round/>
+                      <a:headEnd type="none" w="med" len="med"/>
+                      <a:tailEnd type="none" w="med" len="med"/>
+                    </a:lnB>
+                    <a:solidFill>
+                      <a:srgbClr val="E6E6E6"/>
+                    </a:solidFill>
+                  </a:tcPr>
                 </a:tc>
                 <a:tc>
                   <a:txBody>
                     <a:bodyPr/>
                     <a:lstStyle/>
                     <a:p>
-                      <a:pPr marL="0" marR="0" lvl="0" indent="0" algn="l" rtl="0">
+                      <a:pPr rtl="0" fontAlgn="t">
                         <a:spcBef>
                           <a:spcPts val="0"/>
                         </a:spcBef>
                         <a:spcAft>
                           <a:spcPts val="0"/>
                         </a:spcAft>
-                        <a:buNone/>
                       </a:pPr>
                       <a:r>
-                        <a:rPr lang="en-US" sz="1800"/>
-                        <a:t>Roshni and Gaby available via Slack</a:t>
+                        <a:rPr lang="en-US" sz="1800" b="0" i="0" u="none" strike="noStrike" dirty="0">
+                          <a:solidFill>
+                            <a:srgbClr val="000000"/>
+                          </a:solidFill>
+                          <a:effectLst/>
+                          <a:latin typeface="Calibri" panose="020F0502020204030204" pitchFamily="34" charset="0"/>
+                        </a:rPr>
+                        <a:t>Roshni</a:t>
                       </a:r>
-                      <a:endParaRPr/>
+                      <a:endParaRPr lang="en-US" sz="1400" dirty="0">
+                        <a:effectLst/>
+                      </a:endParaRPr>
                     </a:p>
                   </a:txBody>
-                  <a:tcPr marL="91450" marR="91450" marT="45725" marB="45725"/>
+                  <a:tcPr marL="95164" marR="95164" marT="47582" marB="47582">
+                    <a:lnL w="12697" cap="flat" cmpd="sng" algn="ctr">
+                      <a:solidFill>
+                        <a:srgbClr val="000000"/>
+                      </a:solidFill>
+                      <a:prstDash val="solid"/>
+                      <a:round/>
+                      <a:headEnd type="none" w="med" len="med"/>
+                      <a:tailEnd type="none" w="med" len="med"/>
+                    </a:lnL>
+                    <a:lnR w="12697" cap="flat" cmpd="sng" algn="ctr">
+                      <a:solidFill>
+                        <a:srgbClr val="000000"/>
+                      </a:solidFill>
+                      <a:prstDash val="solid"/>
+                      <a:round/>
+                      <a:headEnd type="none" w="med" len="med"/>
+                      <a:tailEnd type="none" w="med" len="med"/>
+                    </a:lnR>
+                    <a:lnT w="12697" cap="flat" cmpd="sng" algn="ctr">
+                      <a:solidFill>
+                        <a:srgbClr val="000000"/>
+                      </a:solidFill>
+                      <a:prstDash val="solid"/>
+                      <a:round/>
+                      <a:headEnd type="none" w="med" len="med"/>
+                      <a:tailEnd type="none" w="med" len="med"/>
+                    </a:lnT>
+                    <a:lnB w="12697" cap="flat" cmpd="sng" algn="ctr">
+                      <a:solidFill>
+                        <a:srgbClr val="000000"/>
+                      </a:solidFill>
+                      <a:prstDash val="solid"/>
+                      <a:round/>
+                      <a:headEnd type="none" w="med" len="med"/>
+                      <a:tailEnd type="none" w="med" len="med"/>
+                    </a:lnB>
+                    <a:solidFill>
+                      <a:srgbClr val="E6E6E6"/>
+                    </a:solidFill>
+                  </a:tcPr>
                 </a:tc>
                 <a:tc>
                   <a:txBody>
                     <a:bodyPr/>
                     <a:lstStyle/>
                     <a:p>
-                      <a:pPr marL="0" marR="0" lvl="0" indent="0" algn="l" rtl="0">
-                        <a:spcBef>
-                          <a:spcPts val="0"/>
-                        </a:spcBef>
-                        <a:spcAft>
-                          <a:spcPts val="0"/>
-                        </a:spcAft>
-                        <a:buNone/>
-                      </a:pPr>
+                      <a:pPr fontAlgn="t"/>
                       <a:r>
-                        <a:rPr lang="en-US" sz="1800"/>
-                        <a:t>Day 2 05_stats_python_practice</a:t>
+                        <a:rPr lang="en-US" sz="1400" dirty="0">
+                          <a:effectLst/>
+                        </a:rPr>
+                        <a:t> </a:t>
                       </a:r>
-                      <a:endParaRPr sz="1800"/>
                     </a:p>
                   </a:txBody>
-                  <a:tcPr marL="91450" marR="91450" marT="45725" marB="45725"/>
+                  <a:tcPr marL="95164" marR="95164" marT="47582" marB="47582">
+                    <a:lnL w="12697" cap="flat" cmpd="sng" algn="ctr">
+                      <a:solidFill>
+                        <a:srgbClr val="000000"/>
+                      </a:solidFill>
+                      <a:prstDash val="solid"/>
+                      <a:round/>
+                      <a:headEnd type="none" w="med" len="med"/>
+                      <a:tailEnd type="none" w="med" len="med"/>
+                    </a:lnL>
+                    <a:lnR w="12697" cap="flat" cmpd="sng" algn="ctr">
+                      <a:solidFill>
+                        <a:srgbClr val="000000"/>
+                      </a:solidFill>
+                      <a:prstDash val="solid"/>
+                      <a:round/>
+                      <a:headEnd type="none" w="med" len="med"/>
+                      <a:tailEnd type="none" w="med" len="med"/>
+                    </a:lnR>
+                    <a:lnT w="12697" cap="flat" cmpd="sng" algn="ctr">
+                      <a:solidFill>
+                        <a:srgbClr val="000000"/>
+                      </a:solidFill>
+                      <a:prstDash val="solid"/>
+                      <a:round/>
+                      <a:headEnd type="none" w="med" len="med"/>
+                      <a:tailEnd type="none" w="med" len="med"/>
+                    </a:lnT>
+                    <a:lnB w="12697" cap="flat" cmpd="sng" algn="ctr">
+                      <a:solidFill>
+                        <a:srgbClr val="000000"/>
+                      </a:solidFill>
+                      <a:prstDash val="solid"/>
+                      <a:round/>
+                      <a:headEnd type="none" w="med" len="med"/>
+                      <a:tailEnd type="none" w="med" len="med"/>
+                    </a:lnB>
+                    <a:solidFill>
+                      <a:srgbClr val="E6E6E6"/>
+                    </a:solidFill>
+                  </a:tcPr>
                 </a:tc>
                 <a:extLst>
                   <a:ext uri="{0D108BD9-81ED-4DB2-BD59-A6C34878D82A}">
-                    <a16:rowId xmlns:a16="http://schemas.microsoft.com/office/drawing/2014/main" val="10004"/>
-                  </a:ext>
-                </a:extLst>
-              </a:tr>
-              <a:tr h="370850">
-                <a:tc>
-                  <a:txBody>
-                    <a:bodyPr/>
-                    <a:lstStyle/>
-                    <a:p>
-                      <a:pPr marL="0" marR="0" lvl="0" indent="0" algn="l" rtl="0">
-                        <a:spcBef>
-                          <a:spcPts val="0"/>
-                        </a:spcBef>
-                        <a:spcAft>
-                          <a:spcPts val="0"/>
-                        </a:spcAft>
-                        <a:buNone/>
-                      </a:pPr>
-                      <a:r>
-                        <a:rPr lang="en-US" sz="1800"/>
-                        <a:t>4:30pm-5:00pm</a:t>
-                      </a:r>
-                      <a:endParaRPr/>
-                    </a:p>
-                  </a:txBody>
-                  <a:tcPr marL="91450" marR="91450" marT="45725" marB="45725"/>
-                </a:tc>
-                <a:tc>
-                  <a:txBody>
-                    <a:bodyPr/>
-                    <a:lstStyle/>
-                    <a:p>
-                      <a:pPr marL="0" marR="0" lvl="0" indent="0" algn="l" rtl="0">
-                        <a:spcBef>
-                          <a:spcPts val="0"/>
-                        </a:spcBef>
-                        <a:spcAft>
-                          <a:spcPts val="0"/>
-                        </a:spcAft>
-                        <a:buNone/>
-                      </a:pPr>
-                      <a:r>
-                        <a:rPr lang="en-US" sz="1800"/>
-                        <a:t>In-person via zoom</a:t>
-                      </a:r>
-                      <a:endParaRPr/>
-                    </a:p>
-                  </a:txBody>
-                  <a:tcPr marL="91450" marR="91450" marT="45725" marB="45725"/>
-                </a:tc>
-                <a:tc>
-                  <a:txBody>
-                    <a:bodyPr/>
-                    <a:lstStyle/>
-                    <a:p>
-                      <a:pPr marL="0" marR="0" lvl="0" indent="0" algn="l" rtl="0">
-                        <a:spcBef>
-                          <a:spcPts val="0"/>
-                        </a:spcBef>
-                        <a:spcAft>
-                          <a:spcPts val="0"/>
-                        </a:spcAft>
-                        <a:buNone/>
-                      </a:pPr>
-                      <a:r>
-                        <a:rPr lang="en-US" sz="1800"/>
-                        <a:t>Q&amp;A</a:t>
-                      </a:r>
-                      <a:endParaRPr/>
-                    </a:p>
-                  </a:txBody>
-                  <a:tcPr marL="91450" marR="91450" marT="45725" marB="45725"/>
-                </a:tc>
-                <a:tc>
-                  <a:txBody>
-                    <a:bodyPr/>
-                    <a:lstStyle/>
-                    <a:p>
-                      <a:pPr marL="0" marR="0" lvl="0" indent="0" algn="l" rtl="0">
-                        <a:spcBef>
-                          <a:spcPts val="0"/>
-                        </a:spcBef>
-                        <a:spcAft>
-                          <a:spcPts val="0"/>
-                        </a:spcAft>
-                        <a:buNone/>
-                      </a:pPr>
-                      <a:r>
-                        <a:rPr lang="en-US" sz="1800"/>
-                        <a:t>Roshni</a:t>
-                      </a:r>
-                      <a:endParaRPr/>
-                    </a:p>
-                  </a:txBody>
-                  <a:tcPr marL="91450" marR="91450" marT="45725" marB="45725"/>
-                </a:tc>
-                <a:tc>
-                  <a:txBody>
-                    <a:bodyPr/>
-                    <a:lstStyle/>
-                    <a:p>
-                      <a:pPr marL="0" marR="0" lvl="0" indent="0" algn="l" rtl="0">
-                        <a:spcBef>
-                          <a:spcPts val="0"/>
-                        </a:spcBef>
-                        <a:spcAft>
-                          <a:spcPts val="0"/>
-                        </a:spcAft>
-                        <a:buNone/>
-                      </a:pPr>
-                      <a:endParaRPr sz="1800" dirty="0"/>
-                    </a:p>
-                  </a:txBody>
-                  <a:tcPr marL="91450" marR="91450" marT="45725" marB="45725"/>
-                </a:tc>
-                <a:extLst>
-                  <a:ext uri="{0D108BD9-81ED-4DB2-BD59-A6C34878D82A}">
-                    <a16:rowId xmlns:a16="http://schemas.microsoft.com/office/drawing/2014/main" val="10005"/>
+                    <a16:rowId xmlns:a16="http://schemas.microsoft.com/office/drawing/2014/main" val="1650531326"/>
                   </a:ext>
                 </a:extLst>
               </a:tr>
@@ -22340,7 +24002,13 @@
         <p:nvGraphicFramePr>
           <p:cNvPr id="137" name="Google Shape;137;p6"/>
           <p:cNvGraphicFramePr/>
-          <p:nvPr/>
+          <p:nvPr>
+            <p:extLst>
+              <p:ext uri="{D42A27DB-BD31-4B8C-83A1-F6EECF244321}">
+                <p14:modId xmlns:p14="http://schemas.microsoft.com/office/powerpoint/2010/main" val="2890602528"/>
+              </p:ext>
+            </p:extLst>
+          </p:nvPr>
         </p:nvGraphicFramePr>
         <p:xfrm>
           <a:off x="838200" y="1825625"/>
@@ -22620,10 +24288,10 @@
                         <a:buNone/>
                       </a:pPr>
                       <a:r>
-                        <a:rPr lang="en-US" sz="1800"/>
-                        <a:t>06_python_learning</a:t>
+                        <a:rPr lang="en-US" sz="1800" dirty="0"/>
+                        <a:t>ML slides, 06_python_learning</a:t>
                       </a:r>
-                      <a:endParaRPr sz="1800"/>
+                      <a:endParaRPr sz="1800" dirty="0"/>
                     </a:p>
                   </a:txBody>
                   <a:tcPr marL="91450" marR="91450" marT="45725" marB="45725"/>
@@ -23133,10 +24801,10 @@
                         <a:buNone/>
                       </a:pPr>
                       <a:r>
-                        <a:rPr lang="en-US" sz="1800"/>
+                        <a:rPr lang="en-US" sz="1800" dirty="0"/>
                         <a:t>07_python_appl</a:t>
                       </a:r>
-                      <a:endParaRPr sz="1800"/>
+                      <a:endParaRPr sz="1800" dirty="0"/>
                     </a:p>
                   </a:txBody>
                   <a:tcPr marL="91450" marR="91450" marT="45725" marB="45725"/>

</xml_diff>

<commit_message>
change to day1 slides
</commit_message>
<xml_diff>
--- a/workshop_documents/Introduction_workshop_slides.pptx
+++ b/workshop_documents/Introduction_workshop_slides.pptx
@@ -267,7 +267,7 @@
       <p15:sldGuideLst xmlns:p15="http://schemas.microsoft.com/office/powerpoint/2012/main"/>
     </p:ext>
     <p:ext uri="http://customooxmlschemas.google.com/">
-      <go:slidesCustomData xmlns="" xmlns:mc="http://schemas.openxmlformats.org/markup-compatibility/2006" xmlns:mv="urn:schemas-microsoft-com:mac:vml" xmlns:c="http://schemas.openxmlformats.org/drawingml/2006/chart" xmlns:dgm="http://schemas.openxmlformats.org/drawingml/2006/diagram" xmlns:o="urn:schemas-microsoft-com:office:office" xmlns:v="urn:schemas-microsoft-com:vml" xmlns:pvml="urn:schemas-microsoft-com:office:powerpoint" xmlns:com="http://schemas.openxmlformats.org/drawingml/2006/compatibility" xmlns:p14="http://schemas.microsoft.com/office/powerpoint/2010/main" xmlns:p15="http://schemas.microsoft.com/office/powerpoint/2012/main" xmlns:ahyp="http://schemas.microsoft.com/office/drawing/2018/hyperlinkcolor" xmlns:go="http://customooxmlschemas.google.com/" r:id="rId27" roundtripDataSignature="AMtx7miwK0YCmhOXLv/tKLFCIIcQ0wGSYA=="/>
+      <go:slidesCustomData xmlns:go="http://customooxmlschemas.google.com/" xmlns:ahyp="http://schemas.microsoft.com/office/drawing/2018/hyperlinkcolor" xmlns:p15="http://schemas.microsoft.com/office/powerpoint/2012/main" xmlns:p14="http://schemas.microsoft.com/office/powerpoint/2010/main" xmlns:com="http://schemas.openxmlformats.org/drawingml/2006/compatibility" xmlns:pvml="urn:schemas-microsoft-com:office:powerpoint" xmlns:v="urn:schemas-microsoft-com:vml" xmlns:o="urn:schemas-microsoft-com:office:office" xmlns:dgm="http://schemas.openxmlformats.org/drawingml/2006/diagram" xmlns:c="http://schemas.openxmlformats.org/drawingml/2006/chart" xmlns:mv="urn:schemas-microsoft-com:mac:vml" xmlns:mc="http://schemas.openxmlformats.org/markup-compatibility/2006" xmlns="" r:id="rId27" roundtripDataSignature="AMtx7miwK0YCmhOXLv/tKLFCIIcQ0wGSYA=="/>
     </p:ext>
   </p:extLst>
 </p:presentation>
@@ -4179,6 +4179,37 @@
             <a:r>
               <a:rPr lang="en-US" dirty="0"/>
               <a:t>How long all this takes will vary </a:t>
+            </a:r>
+          </a:p>
+          <a:p>
+            <a:pPr marL="0" lvl="0" indent="0" algn="l" rtl="0">
+              <a:spcBef>
+                <a:spcPts val="0"/>
+              </a:spcBef>
+              <a:spcAft>
+                <a:spcPts val="0"/>
+              </a:spcAft>
+              <a:buNone/>
+            </a:pPr>
+            <a:endParaRPr lang="en-US" dirty="0"/>
+          </a:p>
+          <a:p>
+            <a:pPr marL="0" lvl="0" indent="0" algn="l" rtl="0">
+              <a:spcBef>
+                <a:spcPts val="0"/>
+              </a:spcBef>
+              <a:spcAft>
+                <a:spcPts val="0"/>
+              </a:spcAft>
+              <a:buNone/>
+            </a:pPr>
+            <a:r>
+              <a:rPr lang="en-US" dirty="0"/>
+              <a:t>We will pose questions, please answer them either in a chat or unmute yourself – it will be much more interesting then listening to </a:t>
+            </a:r>
+            <a:r>
+              <a:rPr lang="en-US"/>
+              <a:t>us talk for 3 days. </a:t>
             </a:r>
             <a:endParaRPr dirty="0"/>
           </a:p>
@@ -19761,10 +19792,10 @@
               <a:buAutoNum type="arabicPeriod"/>
             </a:pPr>
             <a:r>
-              <a:rPr lang="en-US"/>
+              <a:rPr lang="en-US" dirty="0"/>
               <a:t>Face to face (about 50% of the time via Zoom)</a:t>
             </a:r>
-            <a:endParaRPr/>
+            <a:endParaRPr dirty="0"/>
           </a:p>
           <a:p>
             <a:pPr marL="971550" lvl="1" indent="-514350" algn="l" rtl="0">
@@ -19785,13 +19816,12 @@
               <a:buAutoNum type="arabicPeriod"/>
             </a:pPr>
             <a:r>
-              <a:rPr lang="en-US"/>
+              <a:rPr lang="en-US" dirty="0"/>
               <a:t>Lecturing and Q&amp;A</a:t>
             </a:r>
-            <a:endParaRPr/>
-          </a:p>
-          <a:p>
-            <a:pPr marL="971550" lvl="1" indent="-361950" algn="l" rtl="0">
+          </a:p>
+          <a:p>
+            <a:pPr marL="971550" lvl="1" indent="-514350" algn="l" rtl="0">
               <a:lnSpc>
                 <a:spcPct val="90000"/>
               </a:lnSpc>
@@ -19806,9 +19836,33 @@
               </a:buClr>
               <a:buSzPts val="2400"/>
               <a:buFont typeface="Calibri"/>
-              <a:buNone/>
+              <a:buAutoNum type="arabicPeriod"/>
             </a:pPr>
-            <a:endParaRPr/>
+            <a:r>
+              <a:rPr lang="en-US" dirty="0"/>
+              <a:t>With discussion, conversation.</a:t>
+            </a:r>
+            <a:endParaRPr dirty="0"/>
+          </a:p>
+          <a:p>
+            <a:pPr marL="971550" lvl="1" indent="-361950" algn="l" rtl="0">
+              <a:lnSpc>
+                <a:spcPct val="90000"/>
+              </a:lnSpc>
+              <a:spcBef>
+                <a:spcPts val="500"/>
+              </a:spcBef>
+              <a:spcAft>
+                <a:spcPts val="0"/>
+              </a:spcAft>
+              <a:buClr>
+                <a:schemeClr val="dk1"/>
+              </a:buClr>
+              <a:buSzPts val="2400"/>
+              <a:buFont typeface="Calibri"/>
+              <a:buNone/>
+            </a:pPr>
+            <a:endParaRPr dirty="0"/>
           </a:p>
           <a:p>
             <a:pPr marL="514350" lvl="0" indent="-514350" algn="l" rtl="0">
@@ -19829,10 +19883,10 @@
               <a:buAutoNum type="arabicPeriod"/>
             </a:pPr>
             <a:r>
-              <a:rPr lang="en-US"/>
+              <a:rPr lang="en-US" dirty="0"/>
               <a:t>Online Material (do this sequentially)</a:t>
             </a:r>
-            <a:endParaRPr/>
+            <a:endParaRPr dirty="0"/>
           </a:p>
           <a:p>
             <a:pPr marL="971550" lvl="1" indent="-514350" algn="l" rtl="0">
@@ -19853,10 +19907,10 @@
               <a:buAutoNum type="arabicPeriod"/>
             </a:pPr>
             <a:r>
-              <a:rPr lang="en-US"/>
+              <a:rPr lang="en-US" dirty="0"/>
               <a:t>Videos of screencasts </a:t>
             </a:r>
-            <a:endParaRPr/>
+            <a:endParaRPr dirty="0"/>
           </a:p>
           <a:p>
             <a:pPr marL="971550" lvl="1" indent="-514350" algn="l" rtl="0">
@@ -19877,10 +19931,10 @@
               <a:buAutoNum type="arabicPeriod"/>
             </a:pPr>
             <a:r>
-              <a:rPr lang="en-US"/>
+              <a:rPr lang="en-US" dirty="0"/>
               <a:t>Progress check assignments</a:t>
             </a:r>
-            <a:endParaRPr/>
+            <a:endParaRPr dirty="0"/>
           </a:p>
           <a:p>
             <a:pPr marL="457200" lvl="1" indent="0" algn="l" rtl="0">
@@ -19899,7 +19953,7 @@
               <a:buSzPts val="2400"/>
               <a:buNone/>
             </a:pPr>
-            <a:endParaRPr/>
+            <a:endParaRPr dirty="0"/>
           </a:p>
           <a:p>
             <a:pPr marL="971550" lvl="1" indent="-361950" algn="l" rtl="0">
@@ -19919,7 +19973,7 @@
               <a:buFont typeface="Calibri"/>
               <a:buNone/>
             </a:pPr>
-            <a:endParaRPr/>
+            <a:endParaRPr dirty="0"/>
           </a:p>
         </p:txBody>
       </p:sp>

</xml_diff>